<commit_message>
upload the test bed over view.
</commit_message>
<xml_diff>
--- a/DesignDoc/NCL_ITnOT_TestBed.pptx
+++ b/DesignDoc/NCL_ITnOT_TestBed.pptx
@@ -5,14 +5,15 @@
     <p:sldMasterId id="2147483648" r:id="rId1"/>
   </p:sldMasterIdLst>
   <p:notesMasterIdLst>
-    <p:notesMasterId r:id="rId7"/>
+    <p:notesMasterId r:id="rId8"/>
   </p:notesMasterIdLst>
   <p:sldIdLst>
     <p:sldId id="318" r:id="rId2"/>
-    <p:sldId id="320" r:id="rId3"/>
-    <p:sldId id="319" r:id="rId4"/>
-    <p:sldId id="321" r:id="rId5"/>
-    <p:sldId id="322" r:id="rId6"/>
+    <p:sldId id="323" r:id="rId3"/>
+    <p:sldId id="320" r:id="rId4"/>
+    <p:sldId id="319" r:id="rId5"/>
+    <p:sldId id="321" r:id="rId6"/>
+    <p:sldId id="322" r:id="rId7"/>
   </p:sldIdLst>
   <p:sldSz cx="12192000" cy="6858000"/>
   <p:notesSz cx="6858000" cy="9144000"/>
@@ -111,6 +112,11 @@
       </a:defRPr>
     </a:lvl9pPr>
   </p:defaultTextStyle>
+  <p:extLst>
+    <p:ext uri="{EFAFB233-063F-42B5-8137-9DF3F51BA10A}">
+      <p15:sldGuideLst xmlns:p15="http://schemas.microsoft.com/office/powerpoint/2012/main"/>
+    </p:ext>
+  </p:extLst>
 </p:presentation>
 </file>
 
@@ -196,7 +202,7 @@
           <a:p>
             <a:fld id="{A2F80F4A-A2B2-4A5D-9758-C6E23165BA82}" type="datetimeFigureOut">
               <a:rPr lang="en-SG" smtClean="0"/>
-              <a:t>3/5/2022</a:t>
+              <a:t>4/5/2022</a:t>
             </a:fld>
             <a:endParaRPr lang="en-SG"/>
           </a:p>
@@ -622,7 +628,7 @@
     </p:spTree>
     <p:extLst>
       <p:ext uri="{BB962C8B-B14F-4D97-AF65-F5344CB8AC3E}">
-        <p14:creationId xmlns:p14="http://schemas.microsoft.com/office/powerpoint/2010/main" val="1152589999"/>
+        <p14:creationId xmlns:p14="http://schemas.microsoft.com/office/powerpoint/2010/main" val="505863955"/>
       </p:ext>
     </p:extLst>
   </p:cSld>
@@ -706,7 +712,7 @@
     </p:spTree>
     <p:extLst>
       <p:ext uri="{BB962C8B-B14F-4D97-AF65-F5344CB8AC3E}">
-        <p14:creationId xmlns:p14="http://schemas.microsoft.com/office/powerpoint/2010/main" val="161836730"/>
+        <p14:creationId xmlns:p14="http://schemas.microsoft.com/office/powerpoint/2010/main" val="1152589999"/>
       </p:ext>
     </p:extLst>
   </p:cSld>
@@ -790,7 +796,7 @@
     </p:spTree>
     <p:extLst>
       <p:ext uri="{BB962C8B-B14F-4D97-AF65-F5344CB8AC3E}">
-        <p14:creationId xmlns:p14="http://schemas.microsoft.com/office/powerpoint/2010/main" val="2807505490"/>
+        <p14:creationId xmlns:p14="http://schemas.microsoft.com/office/powerpoint/2010/main" val="161836730"/>
       </p:ext>
     </p:extLst>
   </p:cSld>
@@ -866,6 +872,90 @@
             <a:fld id="{05B0907B-A9FC-4A5F-964B-986AB0761FAC}" type="slidenum">
               <a:rPr lang="en-SG" smtClean="0"/>
               <a:t>5</a:t>
+            </a:fld>
+            <a:endParaRPr lang="en-SG"/>
+          </a:p>
+        </p:txBody>
+      </p:sp>
+    </p:spTree>
+    <p:extLst>
+      <p:ext uri="{BB962C8B-B14F-4D97-AF65-F5344CB8AC3E}">
+        <p14:creationId xmlns:p14="http://schemas.microsoft.com/office/powerpoint/2010/main" val="2807505490"/>
+      </p:ext>
+    </p:extLst>
+  </p:cSld>
+  <p:clrMapOvr>
+    <a:masterClrMapping/>
+  </p:clrMapOvr>
+</p:notes>
+</file>
+
+<file path=ppt/notesSlides/notesSlide6.xml><?xml version="1.0" encoding="utf-8"?>
+<p:notes xmlns:a="http://schemas.openxmlformats.org/drawingml/2006/main" xmlns:r="http://schemas.openxmlformats.org/officeDocument/2006/relationships" xmlns:p="http://schemas.openxmlformats.org/presentationml/2006/main">
+  <p:cSld>
+    <p:spTree>
+      <p:nvGrpSpPr>
+        <p:cNvPr id="1" name=""/>
+        <p:cNvGrpSpPr/>
+        <p:nvPr/>
+      </p:nvGrpSpPr>
+      <p:grpSpPr>
+        <a:xfrm>
+          <a:off x="0" y="0"/>
+          <a:ext cx="0" cy="0"/>
+          <a:chOff x="0" y="0"/>
+          <a:chExt cx="0" cy="0"/>
+        </a:xfrm>
+      </p:grpSpPr>
+      <p:sp>
+        <p:nvSpPr>
+          <p:cNvPr id="2" name="Slide Image Placeholder 1"/>
+          <p:cNvSpPr>
+            <a:spLocks noGrp="1" noRot="1" noChangeAspect="1"/>
+          </p:cNvSpPr>
+          <p:nvPr>
+            <p:ph type="sldImg"/>
+          </p:nvPr>
+        </p:nvSpPr>
+        <p:spPr/>
+      </p:sp>
+      <p:sp>
+        <p:nvSpPr>
+          <p:cNvPr id="3" name="Notes Placeholder 2"/>
+          <p:cNvSpPr>
+            <a:spLocks noGrp="1"/>
+          </p:cNvSpPr>
+          <p:nvPr>
+            <p:ph type="body" idx="1"/>
+          </p:nvPr>
+        </p:nvSpPr>
+        <p:spPr/>
+        <p:txBody>
+          <a:bodyPr/>
+          <a:lstStyle/>
+          <a:p>
+            <a:endParaRPr lang="en-SG" dirty="0"/>
+          </a:p>
+        </p:txBody>
+      </p:sp>
+      <p:sp>
+        <p:nvSpPr>
+          <p:cNvPr id="4" name="Slide Number Placeholder 3"/>
+          <p:cNvSpPr>
+            <a:spLocks noGrp="1"/>
+          </p:cNvSpPr>
+          <p:nvPr>
+            <p:ph type="sldNum" sz="quarter" idx="5"/>
+          </p:nvPr>
+        </p:nvSpPr>
+        <p:spPr/>
+        <p:txBody>
+          <a:bodyPr/>
+          <a:lstStyle/>
+          <a:p>
+            <a:fld id="{05B0907B-A9FC-4A5F-964B-986AB0761FAC}" type="slidenum">
+              <a:rPr lang="en-SG" smtClean="0"/>
+              <a:t>6</a:t>
             </a:fld>
             <a:endParaRPr lang="en-SG"/>
           </a:p>
@@ -1033,7 +1123,7 @@
           <a:p>
             <a:fld id="{1F8F8DC5-A575-4AA1-9B0B-1B8FA5A4DD76}" type="datetimeFigureOut">
               <a:rPr lang="en-SG" smtClean="0"/>
-              <a:t>3/5/2022</a:t>
+              <a:t>4/5/2022</a:t>
             </a:fld>
             <a:endParaRPr lang="en-SG"/>
           </a:p>
@@ -1233,7 +1323,7 @@
           <a:p>
             <a:fld id="{1F8F8DC5-A575-4AA1-9B0B-1B8FA5A4DD76}" type="datetimeFigureOut">
               <a:rPr lang="en-SG" smtClean="0"/>
-              <a:t>3/5/2022</a:t>
+              <a:t>4/5/2022</a:t>
             </a:fld>
             <a:endParaRPr lang="en-SG"/>
           </a:p>
@@ -1443,7 +1533,7 @@
           <a:p>
             <a:fld id="{1F8F8DC5-A575-4AA1-9B0B-1B8FA5A4DD76}" type="datetimeFigureOut">
               <a:rPr lang="en-SG" smtClean="0"/>
-              <a:t>3/5/2022</a:t>
+              <a:t>4/5/2022</a:t>
             </a:fld>
             <a:endParaRPr lang="en-SG"/>
           </a:p>
@@ -1643,7 +1733,7 @@
           <a:p>
             <a:fld id="{1F8F8DC5-A575-4AA1-9B0B-1B8FA5A4DD76}" type="datetimeFigureOut">
               <a:rPr lang="en-SG" smtClean="0"/>
-              <a:t>3/5/2022</a:t>
+              <a:t>4/5/2022</a:t>
             </a:fld>
             <a:endParaRPr lang="en-SG"/>
           </a:p>
@@ -1919,7 +2009,7 @@
           <a:p>
             <a:fld id="{1F8F8DC5-A575-4AA1-9B0B-1B8FA5A4DD76}" type="datetimeFigureOut">
               <a:rPr lang="en-SG" smtClean="0"/>
-              <a:t>3/5/2022</a:t>
+              <a:t>4/5/2022</a:t>
             </a:fld>
             <a:endParaRPr lang="en-SG"/>
           </a:p>
@@ -2187,7 +2277,7 @@
           <a:p>
             <a:fld id="{1F8F8DC5-A575-4AA1-9B0B-1B8FA5A4DD76}" type="datetimeFigureOut">
               <a:rPr lang="en-SG" smtClean="0"/>
-              <a:t>3/5/2022</a:t>
+              <a:t>4/5/2022</a:t>
             </a:fld>
             <a:endParaRPr lang="en-SG"/>
           </a:p>
@@ -2602,7 +2692,7 @@
           <a:p>
             <a:fld id="{1F8F8DC5-A575-4AA1-9B0B-1B8FA5A4DD76}" type="datetimeFigureOut">
               <a:rPr lang="en-SG" smtClean="0"/>
-              <a:t>3/5/2022</a:t>
+              <a:t>4/5/2022</a:t>
             </a:fld>
             <a:endParaRPr lang="en-SG"/>
           </a:p>
@@ -2744,7 +2834,7 @@
           <a:p>
             <a:fld id="{1F8F8DC5-A575-4AA1-9B0B-1B8FA5A4DD76}" type="datetimeFigureOut">
               <a:rPr lang="en-SG" smtClean="0"/>
-              <a:t>3/5/2022</a:t>
+              <a:t>4/5/2022</a:t>
             </a:fld>
             <a:endParaRPr lang="en-SG"/>
           </a:p>
@@ -2857,7 +2947,7 @@
           <a:p>
             <a:fld id="{1F8F8DC5-A575-4AA1-9B0B-1B8FA5A4DD76}" type="datetimeFigureOut">
               <a:rPr lang="en-SG" smtClean="0"/>
-              <a:t>3/5/2022</a:t>
+              <a:t>4/5/2022</a:t>
             </a:fld>
             <a:endParaRPr lang="en-SG"/>
           </a:p>
@@ -3170,7 +3260,7 @@
           <a:p>
             <a:fld id="{1F8F8DC5-A575-4AA1-9B0B-1B8FA5A4DD76}" type="datetimeFigureOut">
               <a:rPr lang="en-SG" smtClean="0"/>
-              <a:t>3/5/2022</a:t>
+              <a:t>4/5/2022</a:t>
             </a:fld>
             <a:endParaRPr lang="en-SG"/>
           </a:p>
@@ -3459,7 +3549,7 @@
           <a:p>
             <a:fld id="{1F8F8DC5-A575-4AA1-9B0B-1B8FA5A4DD76}" type="datetimeFigureOut">
               <a:rPr lang="en-SG" smtClean="0"/>
-              <a:t>3/5/2022</a:t>
+              <a:t>4/5/2022</a:t>
             </a:fld>
             <a:endParaRPr lang="en-SG"/>
           </a:p>
@@ -3702,7 +3792,7 @@
           <a:p>
             <a:fld id="{1F8F8DC5-A575-4AA1-9B0B-1B8FA5A4DD76}" type="datetimeFigureOut">
               <a:rPr lang="en-SG" smtClean="0"/>
-              <a:t>3/5/2022</a:t>
+              <a:t>4/5/2022</a:t>
             </a:fld>
             <a:endParaRPr lang="en-SG"/>
           </a:p>
@@ -4493,7 +4583,7 @@
                 <a:ea typeface="DengXian" panose="02010600030101010101" pitchFamily="2" charset="-122"/>
                 <a:cs typeface="Times New Roman" panose="02020603050405020304" pitchFamily="18" charset="0"/>
               </a:rPr>
-              <a:t>Railway system OT attack test bed</a:t>
+              <a:t>NCL OT System simulation </a:t>
             </a:r>
             <a:endParaRPr lang="en-SG" sz="2400" dirty="0">
               <a:solidFill>
@@ -4561,10 +4651,2041 @@
       </p:pic>
       <p:pic>
         <p:nvPicPr>
-          <p:cNvPr id="3" name="Picture 2">
-            <a:extLst>
-              <a:ext uri="{FF2B5EF4-FFF2-40B4-BE49-F238E27FC236}">
-                <a16:creationId xmlns:a16="http://schemas.microsoft.com/office/drawing/2014/main" id="{CE6A3CC4-561A-82C6-DDC5-EE5FA1D4DA39}"/>
+          <p:cNvPr id="4" name="Picture 2" descr="information technology operational technology IT and OT collaboration 2W Tech IT Consultants manufacturing manufacturers">
+            <a:extLst>
+              <a:ext uri="{FF2B5EF4-FFF2-40B4-BE49-F238E27FC236}">
+                <a16:creationId xmlns:a16="http://schemas.microsoft.com/office/drawing/2014/main" id="{7DB35ACF-CD50-B0DE-2C4A-E44FCC7C81CE}"/>
+              </a:ext>
+            </a:extLst>
+          </p:cNvPr>
+          <p:cNvPicPr>
+            <a:picLocks noChangeAspect="1" noChangeArrowheads="1"/>
+          </p:cNvPicPr>
+          <p:nvPr/>
+        </p:nvPicPr>
+        <p:blipFill>
+          <a:blip r:embed="rId4">
+            <a:extLst>
+              <a:ext uri="{28A0092B-C50C-407E-A947-70E740481C1C}">
+                <a14:useLocalDpi xmlns:a14="http://schemas.microsoft.com/office/drawing/2010/main" val="0"/>
+              </a:ext>
+            </a:extLst>
+          </a:blip>
+          <a:srcRect/>
+          <a:stretch>
+            <a:fillRect/>
+          </a:stretch>
+        </p:blipFill>
+        <p:spPr bwMode="auto">
+          <a:xfrm>
+            <a:off x="2829261" y="2364592"/>
+            <a:ext cx="3989182" cy="1972832"/>
+          </a:xfrm>
+          <a:prstGeom prst="rect">
+            <a:avLst/>
+          </a:prstGeom>
+          <a:noFill/>
+          <a:extLst>
+            <a:ext uri="{909E8E84-426E-40DD-AFC4-6F175D3DCCD1}">
+              <a14:hiddenFill xmlns:a14="http://schemas.microsoft.com/office/drawing/2010/main">
+                <a:solidFill>
+                  <a:srgbClr val="FFFFFF"/>
+                </a:solidFill>
+              </a14:hiddenFill>
+            </a:ext>
+          </a:extLst>
+        </p:spPr>
+      </p:pic>
+      <p:sp>
+        <p:nvSpPr>
+          <p:cNvPr id="7" name="Rectangle 6">
+            <a:extLst>
+              <a:ext uri="{FF2B5EF4-FFF2-40B4-BE49-F238E27FC236}">
+                <a16:creationId xmlns:a16="http://schemas.microsoft.com/office/drawing/2014/main" id="{6B6B2159-6D4F-30A3-9547-EE70A25054F0}"/>
+              </a:ext>
+            </a:extLst>
+          </p:cNvPr>
+          <p:cNvSpPr/>
+          <p:nvPr/>
+        </p:nvSpPr>
+        <p:spPr>
+          <a:xfrm>
+            <a:off x="1861073" y="1947135"/>
+            <a:ext cx="6260951" cy="3614568"/>
+          </a:xfrm>
+          <a:prstGeom prst="rect">
+            <a:avLst/>
+          </a:prstGeom>
+          <a:noFill/>
+        </p:spPr>
+        <p:style>
+          <a:lnRef idx="2">
+            <a:schemeClr val="accent1">
+              <a:shade val="50000"/>
+            </a:schemeClr>
+          </a:lnRef>
+          <a:fillRef idx="1">
+            <a:schemeClr val="accent1"/>
+          </a:fillRef>
+          <a:effectRef idx="0">
+            <a:schemeClr val="accent1"/>
+          </a:effectRef>
+          <a:fontRef idx="minor">
+            <a:schemeClr val="lt1"/>
+          </a:fontRef>
+        </p:style>
+        <p:txBody>
+          <a:bodyPr rtlCol="0" anchor="ctr"/>
+          <a:lstStyle/>
+          <a:p>
+            <a:pPr algn="ctr"/>
+            <a:endParaRPr lang="en-SG"/>
+          </a:p>
+        </p:txBody>
+      </p:sp>
+      <p:pic>
+        <p:nvPicPr>
+          <p:cNvPr id="8" name="Picture 4">
+            <a:extLst>
+              <a:ext uri="{FF2B5EF4-FFF2-40B4-BE49-F238E27FC236}">
+                <a16:creationId xmlns:a16="http://schemas.microsoft.com/office/drawing/2014/main" id="{315F9173-C89B-6ADD-E601-30261224F5A4}"/>
+              </a:ext>
+            </a:extLst>
+          </p:cNvPr>
+          <p:cNvPicPr>
+            <a:picLocks noChangeAspect="1" noChangeArrowheads="1"/>
+          </p:cNvPicPr>
+          <p:nvPr/>
+        </p:nvPicPr>
+        <p:blipFill>
+          <a:blip r:embed="rId5">
+            <a:extLst>
+              <a:ext uri="{28A0092B-C50C-407E-A947-70E740481C1C}">
+                <a14:useLocalDpi xmlns:a14="http://schemas.microsoft.com/office/drawing/2010/main" val="0"/>
+              </a:ext>
+            </a:extLst>
+          </a:blip>
+          <a:srcRect/>
+          <a:stretch>
+            <a:fillRect/>
+          </a:stretch>
+        </p:blipFill>
+        <p:spPr bwMode="auto">
+          <a:xfrm>
+            <a:off x="8743837" y="2498501"/>
+            <a:ext cx="551642" cy="551642"/>
+          </a:xfrm>
+          <a:prstGeom prst="rect">
+            <a:avLst/>
+          </a:prstGeom>
+          <a:noFill/>
+          <a:extLst>
+            <a:ext uri="{909E8E84-426E-40DD-AFC4-6F175D3DCCD1}">
+              <a14:hiddenFill xmlns:a14="http://schemas.microsoft.com/office/drawing/2010/main">
+                <a:solidFill>
+                  <a:srgbClr val="FFFFFF"/>
+                </a:solidFill>
+              </a14:hiddenFill>
+            </a:ext>
+          </a:extLst>
+        </p:spPr>
+      </p:pic>
+      <p:sp>
+        <p:nvSpPr>
+          <p:cNvPr id="9" name="TextBox 8">
+            <a:extLst>
+              <a:ext uri="{FF2B5EF4-FFF2-40B4-BE49-F238E27FC236}">
+                <a16:creationId xmlns:a16="http://schemas.microsoft.com/office/drawing/2014/main" id="{41AF3A42-990B-1D2A-A0E1-562C79237E6D}"/>
+              </a:ext>
+            </a:extLst>
+          </p:cNvPr>
+          <p:cNvSpPr txBox="1"/>
+          <p:nvPr/>
+        </p:nvSpPr>
+        <p:spPr>
+          <a:xfrm>
+            <a:off x="1819087" y="1968427"/>
+            <a:ext cx="2747990" cy="307777"/>
+          </a:xfrm>
+          <a:prstGeom prst="rect">
+            <a:avLst/>
+          </a:prstGeom>
+          <a:noFill/>
+        </p:spPr>
+        <p:txBody>
+          <a:bodyPr wrap="square" rtlCol="0">
+            <a:spAutoFit/>
+          </a:bodyPr>
+          <a:lstStyle/>
+          <a:p>
+            <a:r>
+              <a:rPr lang="en-US" sz="1400" dirty="0"/>
+              <a:t>NCL OT Training Test Bed</a:t>
+            </a:r>
+            <a:endParaRPr lang="en-SG" sz="1400" dirty="0"/>
+          </a:p>
+        </p:txBody>
+      </p:sp>
+      <p:sp>
+        <p:nvSpPr>
+          <p:cNvPr id="10" name="TextBox 9">
+            <a:extLst>
+              <a:ext uri="{FF2B5EF4-FFF2-40B4-BE49-F238E27FC236}">
+                <a16:creationId xmlns:a16="http://schemas.microsoft.com/office/drawing/2014/main" id="{480CA3A3-CED8-286D-47FD-3F3F79EDD323}"/>
+              </a:ext>
+            </a:extLst>
+          </p:cNvPr>
+          <p:cNvSpPr txBox="1"/>
+          <p:nvPr/>
+        </p:nvSpPr>
+        <p:spPr>
+          <a:xfrm>
+            <a:off x="9237589" y="2620433"/>
+            <a:ext cx="1107198" cy="307777"/>
+          </a:xfrm>
+          <a:prstGeom prst="rect">
+            <a:avLst/>
+          </a:prstGeom>
+          <a:noFill/>
+        </p:spPr>
+        <p:txBody>
+          <a:bodyPr wrap="square" rtlCol="0">
+            <a:spAutoFit/>
+          </a:bodyPr>
+          <a:lstStyle/>
+          <a:p>
+            <a:r>
+              <a:rPr lang="en-US" sz="1400" dirty="0"/>
+              <a:t>OT engineer</a:t>
+            </a:r>
+            <a:endParaRPr lang="en-SG" sz="1400" dirty="0"/>
+          </a:p>
+        </p:txBody>
+      </p:sp>
+      <p:pic>
+        <p:nvPicPr>
+          <p:cNvPr id="11" name="Picture 4" descr="Enapter Handbook">
+            <a:extLst>
+              <a:ext uri="{FF2B5EF4-FFF2-40B4-BE49-F238E27FC236}">
+                <a16:creationId xmlns:a16="http://schemas.microsoft.com/office/drawing/2014/main" id="{D500A1A1-CB86-E54C-ADFD-B9206B346F5C}"/>
+              </a:ext>
+            </a:extLst>
+          </p:cNvPr>
+          <p:cNvPicPr>
+            <a:picLocks noChangeAspect="1" noChangeArrowheads="1"/>
+          </p:cNvPicPr>
+          <p:nvPr/>
+        </p:nvPicPr>
+        <p:blipFill>
+          <a:blip r:embed="rId6">
+            <a:extLst>
+              <a:ext uri="{28A0092B-C50C-407E-A947-70E740481C1C}">
+                <a14:useLocalDpi xmlns:a14="http://schemas.microsoft.com/office/drawing/2010/main" val="0"/>
+              </a:ext>
+            </a:extLst>
+          </a:blip>
+          <a:srcRect/>
+          <a:stretch>
+            <a:fillRect/>
+          </a:stretch>
+        </p:blipFill>
+        <p:spPr bwMode="auto">
+          <a:xfrm>
+            <a:off x="6657499" y="2745923"/>
+            <a:ext cx="537266" cy="537266"/>
+          </a:xfrm>
+          <a:prstGeom prst="rect">
+            <a:avLst/>
+          </a:prstGeom>
+          <a:noFill/>
+          <a:extLst>
+            <a:ext uri="{909E8E84-426E-40DD-AFC4-6F175D3DCCD1}">
+              <a14:hiddenFill xmlns:a14="http://schemas.microsoft.com/office/drawing/2010/main">
+                <a:solidFill>
+                  <a:srgbClr val="FFFFFF"/>
+                </a:solidFill>
+              </a14:hiddenFill>
+            </a:ext>
+          </a:extLst>
+        </p:spPr>
+      </p:pic>
+      <p:sp>
+        <p:nvSpPr>
+          <p:cNvPr id="12" name="TextBox 11">
+            <a:extLst>
+              <a:ext uri="{FF2B5EF4-FFF2-40B4-BE49-F238E27FC236}">
+                <a16:creationId xmlns:a16="http://schemas.microsoft.com/office/drawing/2014/main" id="{36281B43-7A4C-C4B0-62E0-6573790856E6}"/>
+              </a:ext>
+            </a:extLst>
+          </p:cNvPr>
+          <p:cNvSpPr txBox="1"/>
+          <p:nvPr/>
+        </p:nvSpPr>
+        <p:spPr>
+          <a:xfrm>
+            <a:off x="7194764" y="2796416"/>
+            <a:ext cx="537265" cy="307777"/>
+          </a:xfrm>
+          <a:prstGeom prst="rect">
+            <a:avLst/>
+          </a:prstGeom>
+          <a:noFill/>
+        </p:spPr>
+        <p:txBody>
+          <a:bodyPr wrap="square" rtlCol="0">
+            <a:spAutoFit/>
+          </a:bodyPr>
+          <a:lstStyle/>
+          <a:p>
+            <a:r>
+              <a:rPr lang="en-US" sz="1400" dirty="0"/>
+              <a:t>PCL</a:t>
+            </a:r>
+            <a:endParaRPr lang="en-SG" sz="1400" dirty="0"/>
+          </a:p>
+        </p:txBody>
+      </p:sp>
+      <p:cxnSp>
+        <p:nvCxnSpPr>
+          <p:cNvPr id="13" name="Straight Arrow Connector 12">
+            <a:extLst>
+              <a:ext uri="{FF2B5EF4-FFF2-40B4-BE49-F238E27FC236}">
+                <a16:creationId xmlns:a16="http://schemas.microsoft.com/office/drawing/2014/main" id="{6F3B39D1-165E-3B45-C474-177DF68DAC56}"/>
+              </a:ext>
+            </a:extLst>
+          </p:cNvPr>
+          <p:cNvCxnSpPr>
+            <a:cxnSpLocks/>
+          </p:cNvCxnSpPr>
+          <p:nvPr/>
+        </p:nvCxnSpPr>
+        <p:spPr>
+          <a:xfrm>
+            <a:off x="6207163" y="3017735"/>
+            <a:ext cx="419475" cy="0"/>
+          </a:xfrm>
+          <a:prstGeom prst="straightConnector1">
+            <a:avLst/>
+          </a:prstGeom>
+          <a:ln w="19050">
+            <a:tailEnd type="triangle"/>
+          </a:ln>
+        </p:spPr>
+        <p:style>
+          <a:lnRef idx="1">
+            <a:schemeClr val="accent1"/>
+          </a:lnRef>
+          <a:fillRef idx="0">
+            <a:schemeClr val="accent1"/>
+          </a:fillRef>
+          <a:effectRef idx="0">
+            <a:schemeClr val="accent1"/>
+          </a:effectRef>
+          <a:fontRef idx="minor">
+            <a:schemeClr val="tx1"/>
+          </a:fontRef>
+        </p:style>
+      </p:cxnSp>
+      <p:cxnSp>
+        <p:nvCxnSpPr>
+          <p:cNvPr id="14" name="Straight Arrow Connector 13">
+            <a:extLst>
+              <a:ext uri="{FF2B5EF4-FFF2-40B4-BE49-F238E27FC236}">
+                <a16:creationId xmlns:a16="http://schemas.microsoft.com/office/drawing/2014/main" id="{78AC0334-8DB3-D766-96A2-BAB32F9F9105}"/>
+              </a:ext>
+            </a:extLst>
+          </p:cNvPr>
+          <p:cNvCxnSpPr>
+            <a:cxnSpLocks/>
+          </p:cNvCxnSpPr>
+          <p:nvPr/>
+        </p:nvCxnSpPr>
+        <p:spPr>
+          <a:xfrm>
+            <a:off x="6207163" y="3492864"/>
+            <a:ext cx="450336" cy="0"/>
+          </a:xfrm>
+          <a:prstGeom prst="straightConnector1">
+            <a:avLst/>
+          </a:prstGeom>
+          <a:ln w="19050">
+            <a:tailEnd type="triangle"/>
+          </a:ln>
+        </p:spPr>
+        <p:style>
+          <a:lnRef idx="1">
+            <a:schemeClr val="accent1"/>
+          </a:lnRef>
+          <a:fillRef idx="0">
+            <a:schemeClr val="accent1"/>
+          </a:fillRef>
+          <a:effectRef idx="0">
+            <a:schemeClr val="accent1"/>
+          </a:effectRef>
+          <a:fontRef idx="minor">
+            <a:schemeClr val="tx1"/>
+          </a:fontRef>
+        </p:style>
+      </p:cxnSp>
+      <p:pic>
+        <p:nvPicPr>
+          <p:cNvPr id="15" name="Picture 6" descr="Sensor - Free electronics icons">
+            <a:extLst>
+              <a:ext uri="{FF2B5EF4-FFF2-40B4-BE49-F238E27FC236}">
+                <a16:creationId xmlns:a16="http://schemas.microsoft.com/office/drawing/2014/main" id="{F27B0AD1-6638-DDC1-3DB5-74F218DD7941}"/>
+              </a:ext>
+            </a:extLst>
+          </p:cNvPr>
+          <p:cNvPicPr>
+            <a:picLocks noChangeAspect="1" noChangeArrowheads="1"/>
+          </p:cNvPicPr>
+          <p:nvPr/>
+        </p:nvPicPr>
+        <p:blipFill>
+          <a:blip r:embed="rId7">
+            <a:extLst>
+              <a:ext uri="{28A0092B-C50C-407E-A947-70E740481C1C}">
+                <a14:useLocalDpi xmlns:a14="http://schemas.microsoft.com/office/drawing/2010/main" val="0"/>
+              </a:ext>
+            </a:extLst>
+          </a:blip>
+          <a:srcRect/>
+          <a:stretch>
+            <a:fillRect/>
+          </a:stretch>
+        </p:blipFill>
+        <p:spPr bwMode="auto">
+          <a:xfrm>
+            <a:off x="6732802" y="3326092"/>
+            <a:ext cx="461962" cy="461962"/>
+          </a:xfrm>
+          <a:prstGeom prst="rect">
+            <a:avLst/>
+          </a:prstGeom>
+          <a:noFill/>
+          <a:extLst>
+            <a:ext uri="{909E8E84-426E-40DD-AFC4-6F175D3DCCD1}">
+              <a14:hiddenFill xmlns:a14="http://schemas.microsoft.com/office/drawing/2010/main">
+                <a:solidFill>
+                  <a:srgbClr val="FFFFFF"/>
+                </a:solidFill>
+              </a14:hiddenFill>
+            </a:ext>
+          </a:extLst>
+        </p:spPr>
+      </p:pic>
+      <p:sp>
+        <p:nvSpPr>
+          <p:cNvPr id="16" name="TextBox 15">
+            <a:extLst>
+              <a:ext uri="{FF2B5EF4-FFF2-40B4-BE49-F238E27FC236}">
+                <a16:creationId xmlns:a16="http://schemas.microsoft.com/office/drawing/2014/main" id="{FDFA5126-A536-8391-5BC2-0DA3BEAB4DEB}"/>
+              </a:ext>
+            </a:extLst>
+          </p:cNvPr>
+          <p:cNvSpPr txBox="1"/>
+          <p:nvPr/>
+        </p:nvSpPr>
+        <p:spPr>
+          <a:xfrm>
+            <a:off x="7200352" y="3369700"/>
+            <a:ext cx="792580" cy="307777"/>
+          </a:xfrm>
+          <a:prstGeom prst="rect">
+            <a:avLst/>
+          </a:prstGeom>
+          <a:noFill/>
+        </p:spPr>
+        <p:txBody>
+          <a:bodyPr wrap="square" rtlCol="0">
+            <a:spAutoFit/>
+          </a:bodyPr>
+          <a:lstStyle/>
+          <a:p>
+            <a:r>
+              <a:rPr lang="en-US" sz="1400" dirty="0"/>
+              <a:t>sensors</a:t>
+            </a:r>
+            <a:endParaRPr lang="en-SG" sz="1400" dirty="0"/>
+          </a:p>
+        </p:txBody>
+      </p:sp>
+      <p:pic>
+        <p:nvPicPr>
+          <p:cNvPr id="17" name="Picture 8" descr="Electrical circuit - Free technology icons">
+            <a:extLst>
+              <a:ext uri="{FF2B5EF4-FFF2-40B4-BE49-F238E27FC236}">
+                <a16:creationId xmlns:a16="http://schemas.microsoft.com/office/drawing/2014/main" id="{4F32E48B-A9B6-774C-82CA-AB4FAA5A61A6}"/>
+              </a:ext>
+            </a:extLst>
+          </p:cNvPr>
+          <p:cNvPicPr>
+            <a:picLocks noChangeAspect="1" noChangeArrowheads="1"/>
+          </p:cNvPicPr>
+          <p:nvPr/>
+        </p:nvPicPr>
+        <p:blipFill>
+          <a:blip r:embed="rId8">
+            <a:extLst>
+              <a:ext uri="{28A0092B-C50C-407E-A947-70E740481C1C}">
+                <a14:useLocalDpi xmlns:a14="http://schemas.microsoft.com/office/drawing/2010/main" val="0"/>
+              </a:ext>
+            </a:extLst>
+          </a:blip>
+          <a:srcRect/>
+          <a:stretch>
+            <a:fillRect/>
+          </a:stretch>
+        </p:blipFill>
+        <p:spPr bwMode="auto">
+          <a:xfrm>
+            <a:off x="6743901" y="3808554"/>
+            <a:ext cx="461962" cy="461962"/>
+          </a:xfrm>
+          <a:prstGeom prst="rect">
+            <a:avLst/>
+          </a:prstGeom>
+          <a:noFill/>
+          <a:extLst>
+            <a:ext uri="{909E8E84-426E-40DD-AFC4-6F175D3DCCD1}">
+              <a14:hiddenFill xmlns:a14="http://schemas.microsoft.com/office/drawing/2010/main">
+                <a:solidFill>
+                  <a:srgbClr val="FFFFFF"/>
+                </a:solidFill>
+              </a14:hiddenFill>
+            </a:ext>
+          </a:extLst>
+        </p:spPr>
+      </p:pic>
+      <p:cxnSp>
+        <p:nvCxnSpPr>
+          <p:cNvPr id="18" name="Straight Arrow Connector 17">
+            <a:extLst>
+              <a:ext uri="{FF2B5EF4-FFF2-40B4-BE49-F238E27FC236}">
+                <a16:creationId xmlns:a16="http://schemas.microsoft.com/office/drawing/2014/main" id="{4AB96CDC-77E7-A43C-089A-2C7C590DF1A4}"/>
+              </a:ext>
+            </a:extLst>
+          </p:cNvPr>
+          <p:cNvCxnSpPr>
+            <a:cxnSpLocks/>
+          </p:cNvCxnSpPr>
+          <p:nvPr/>
+        </p:nvCxnSpPr>
+        <p:spPr>
+          <a:xfrm>
+            <a:off x="6207163" y="3924963"/>
+            <a:ext cx="450336" cy="0"/>
+          </a:xfrm>
+          <a:prstGeom prst="straightConnector1">
+            <a:avLst/>
+          </a:prstGeom>
+          <a:ln w="19050">
+            <a:tailEnd type="triangle"/>
+          </a:ln>
+        </p:spPr>
+        <p:style>
+          <a:lnRef idx="1">
+            <a:schemeClr val="accent1"/>
+          </a:lnRef>
+          <a:fillRef idx="0">
+            <a:schemeClr val="accent1"/>
+          </a:fillRef>
+          <a:effectRef idx="0">
+            <a:schemeClr val="accent1"/>
+          </a:effectRef>
+          <a:fontRef idx="minor">
+            <a:schemeClr val="tx1"/>
+          </a:fontRef>
+        </p:style>
+      </p:cxnSp>
+      <p:sp>
+        <p:nvSpPr>
+          <p:cNvPr id="19" name="TextBox 18">
+            <a:extLst>
+              <a:ext uri="{FF2B5EF4-FFF2-40B4-BE49-F238E27FC236}">
+                <a16:creationId xmlns:a16="http://schemas.microsoft.com/office/drawing/2014/main" id="{273EF89C-91E1-BD96-6E77-22A39B087711}"/>
+              </a:ext>
+            </a:extLst>
+          </p:cNvPr>
+          <p:cNvSpPr txBox="1"/>
+          <p:nvPr/>
+        </p:nvSpPr>
+        <p:spPr>
+          <a:xfrm>
+            <a:off x="7238477" y="3878093"/>
+            <a:ext cx="792580" cy="307777"/>
+          </a:xfrm>
+          <a:prstGeom prst="rect">
+            <a:avLst/>
+          </a:prstGeom>
+          <a:noFill/>
+        </p:spPr>
+        <p:txBody>
+          <a:bodyPr wrap="square" rtlCol="0">
+            <a:spAutoFit/>
+          </a:bodyPr>
+          <a:lstStyle/>
+          <a:p>
+            <a:r>
+              <a:rPr lang="en-US" sz="1400" dirty="0"/>
+              <a:t>circuit</a:t>
+            </a:r>
+            <a:endParaRPr lang="en-SG" sz="1400" dirty="0"/>
+          </a:p>
+        </p:txBody>
+      </p:sp>
+      <p:sp>
+        <p:nvSpPr>
+          <p:cNvPr id="2" name="Rectangle 1">
+            <a:extLst>
+              <a:ext uri="{FF2B5EF4-FFF2-40B4-BE49-F238E27FC236}">
+                <a16:creationId xmlns:a16="http://schemas.microsoft.com/office/drawing/2014/main" id="{F57ADC1D-B3FB-8D8F-3D83-0CC0281C8A5B}"/>
+              </a:ext>
+            </a:extLst>
+          </p:cNvPr>
+          <p:cNvSpPr/>
+          <p:nvPr/>
+        </p:nvSpPr>
+        <p:spPr>
+          <a:xfrm>
+            <a:off x="6486862" y="2254914"/>
+            <a:ext cx="1506070" cy="2192190"/>
+          </a:xfrm>
+          <a:prstGeom prst="rect">
+            <a:avLst/>
+          </a:prstGeom>
+          <a:noFill/>
+          <a:ln>
+            <a:prstDash val="dash"/>
+          </a:ln>
+        </p:spPr>
+        <p:style>
+          <a:lnRef idx="2">
+            <a:schemeClr val="accent1">
+              <a:shade val="50000"/>
+            </a:schemeClr>
+          </a:lnRef>
+          <a:fillRef idx="1">
+            <a:schemeClr val="accent1"/>
+          </a:fillRef>
+          <a:effectRef idx="0">
+            <a:schemeClr val="accent1"/>
+          </a:effectRef>
+          <a:fontRef idx="minor">
+            <a:schemeClr val="lt1"/>
+          </a:fontRef>
+        </p:style>
+        <p:txBody>
+          <a:bodyPr rtlCol="0" anchor="ctr"/>
+          <a:lstStyle/>
+          <a:p>
+            <a:pPr algn="ctr"/>
+            <a:endParaRPr lang="en-SG" dirty="0"/>
+          </a:p>
+        </p:txBody>
+      </p:sp>
+      <p:sp>
+        <p:nvSpPr>
+          <p:cNvPr id="20" name="TextBox 19">
+            <a:extLst>
+              <a:ext uri="{FF2B5EF4-FFF2-40B4-BE49-F238E27FC236}">
+                <a16:creationId xmlns:a16="http://schemas.microsoft.com/office/drawing/2014/main" id="{FAAF99AD-EB48-71A0-DFAE-5C71EBA6619E}"/>
+              </a:ext>
+            </a:extLst>
+          </p:cNvPr>
+          <p:cNvSpPr txBox="1"/>
+          <p:nvPr/>
+        </p:nvSpPr>
+        <p:spPr>
+          <a:xfrm>
+            <a:off x="6538994" y="2291495"/>
+            <a:ext cx="1453938" cy="461665"/>
+          </a:xfrm>
+          <a:prstGeom prst="rect">
+            <a:avLst/>
+          </a:prstGeom>
+          <a:noFill/>
+        </p:spPr>
+        <p:txBody>
+          <a:bodyPr wrap="square" rtlCol="0">
+            <a:spAutoFit/>
+          </a:bodyPr>
+          <a:lstStyle/>
+          <a:p>
+            <a:r>
+              <a:rPr lang="en-US" sz="1200" dirty="0"/>
+              <a:t>NCL OT component simulator</a:t>
+            </a:r>
+            <a:endParaRPr lang="en-SG" sz="1200" dirty="0"/>
+          </a:p>
+        </p:txBody>
+      </p:sp>
+      <p:pic>
+        <p:nvPicPr>
+          <p:cNvPr id="21" name="Picture 4">
+            <a:extLst>
+              <a:ext uri="{FF2B5EF4-FFF2-40B4-BE49-F238E27FC236}">
+                <a16:creationId xmlns:a16="http://schemas.microsoft.com/office/drawing/2014/main" id="{BF5FA1D5-9B2F-42F3-23D8-5425509DA799}"/>
+              </a:ext>
+            </a:extLst>
+          </p:cNvPr>
+          <p:cNvPicPr>
+            <a:picLocks noChangeAspect="1" noChangeArrowheads="1"/>
+          </p:cNvPicPr>
+          <p:nvPr/>
+        </p:nvPicPr>
+        <p:blipFill>
+          <a:blip r:embed="rId5">
+            <a:extLst>
+              <a:ext uri="{28A0092B-C50C-407E-A947-70E740481C1C}">
+                <a14:useLocalDpi xmlns:a14="http://schemas.microsoft.com/office/drawing/2010/main" val="0"/>
+              </a:ext>
+            </a:extLst>
+          </a:blip>
+          <a:srcRect/>
+          <a:stretch>
+            <a:fillRect/>
+          </a:stretch>
+        </p:blipFill>
+        <p:spPr bwMode="auto">
+          <a:xfrm>
+            <a:off x="8807530" y="4853074"/>
+            <a:ext cx="551642" cy="551642"/>
+          </a:xfrm>
+          <a:prstGeom prst="rect">
+            <a:avLst/>
+          </a:prstGeom>
+          <a:noFill/>
+          <a:extLst>
+            <a:ext uri="{909E8E84-426E-40DD-AFC4-6F175D3DCCD1}">
+              <a14:hiddenFill xmlns:a14="http://schemas.microsoft.com/office/drawing/2010/main">
+                <a:solidFill>
+                  <a:srgbClr val="FFFFFF"/>
+                </a:solidFill>
+              </a14:hiddenFill>
+            </a:ext>
+          </a:extLst>
+        </p:spPr>
+      </p:pic>
+      <p:pic>
+        <p:nvPicPr>
+          <p:cNvPr id="2050" name="Picture 2" descr="User Interface - EXIoT - Exilight">
+            <a:extLst>
+              <a:ext uri="{FF2B5EF4-FFF2-40B4-BE49-F238E27FC236}">
+                <a16:creationId xmlns:a16="http://schemas.microsoft.com/office/drawing/2014/main" id="{770285E3-5A37-11A3-7077-9A54ED324638}"/>
+              </a:ext>
+            </a:extLst>
+          </p:cNvPr>
+          <p:cNvPicPr>
+            <a:picLocks noChangeAspect="1" noChangeArrowheads="1"/>
+          </p:cNvPicPr>
+          <p:nvPr/>
+        </p:nvPicPr>
+        <p:blipFill>
+          <a:blip r:embed="rId9">
+            <a:extLst>
+              <a:ext uri="{28A0092B-C50C-407E-A947-70E740481C1C}">
+                <a14:useLocalDpi xmlns:a14="http://schemas.microsoft.com/office/drawing/2010/main" val="0"/>
+              </a:ext>
+            </a:extLst>
+          </a:blip>
+          <a:srcRect/>
+          <a:stretch>
+            <a:fillRect/>
+          </a:stretch>
+        </p:blipFill>
+        <p:spPr bwMode="auto">
+          <a:xfrm>
+            <a:off x="6552673" y="4867285"/>
+            <a:ext cx="668459" cy="668459"/>
+          </a:xfrm>
+          <a:prstGeom prst="rect">
+            <a:avLst/>
+          </a:prstGeom>
+          <a:noFill/>
+          <a:extLst>
+            <a:ext uri="{909E8E84-426E-40DD-AFC4-6F175D3DCCD1}">
+              <a14:hiddenFill xmlns:a14="http://schemas.microsoft.com/office/drawing/2010/main">
+                <a:solidFill>
+                  <a:srgbClr val="FFFFFF"/>
+                </a:solidFill>
+              </a14:hiddenFill>
+            </a:ext>
+          </a:extLst>
+        </p:spPr>
+      </p:pic>
+      <p:pic>
+        <p:nvPicPr>
+          <p:cNvPr id="2052" name="Picture 4" descr="scada-icon | Friends Engineering Corporation">
+            <a:extLst>
+              <a:ext uri="{FF2B5EF4-FFF2-40B4-BE49-F238E27FC236}">
+                <a16:creationId xmlns:a16="http://schemas.microsoft.com/office/drawing/2014/main" id="{0A88312E-E2DA-BACA-D486-49662DF0B0AD}"/>
+              </a:ext>
+            </a:extLst>
+          </p:cNvPr>
+          <p:cNvPicPr>
+            <a:picLocks noChangeAspect="1" noChangeArrowheads="1"/>
+          </p:cNvPicPr>
+          <p:nvPr/>
+        </p:nvPicPr>
+        <p:blipFill>
+          <a:blip r:embed="rId10">
+            <a:extLst>
+              <a:ext uri="{28A0092B-C50C-407E-A947-70E740481C1C}">
+                <a14:useLocalDpi xmlns:a14="http://schemas.microsoft.com/office/drawing/2010/main" val="0"/>
+              </a:ext>
+            </a:extLst>
+          </a:blip>
+          <a:srcRect/>
+          <a:stretch>
+            <a:fillRect/>
+          </a:stretch>
+        </p:blipFill>
+        <p:spPr bwMode="auto">
+          <a:xfrm>
+            <a:off x="4381841" y="3838510"/>
+            <a:ext cx="683268" cy="683268"/>
+          </a:xfrm>
+          <a:prstGeom prst="rect">
+            <a:avLst/>
+          </a:prstGeom>
+          <a:noFill/>
+          <a:extLst>
+            <a:ext uri="{909E8E84-426E-40DD-AFC4-6F175D3DCCD1}">
+              <a14:hiddenFill xmlns:a14="http://schemas.microsoft.com/office/drawing/2010/main">
+                <a:solidFill>
+                  <a:srgbClr val="FFFFFF"/>
+                </a:solidFill>
+              </a14:hiddenFill>
+            </a:ext>
+          </a:extLst>
+        </p:spPr>
+      </p:pic>
+      <p:sp>
+        <p:nvSpPr>
+          <p:cNvPr id="24" name="TextBox 23">
+            <a:extLst>
+              <a:ext uri="{FF2B5EF4-FFF2-40B4-BE49-F238E27FC236}">
+                <a16:creationId xmlns:a16="http://schemas.microsoft.com/office/drawing/2014/main" id="{F4774769-1C7E-5BB6-F05B-B91D9D6AEC25}"/>
+              </a:ext>
+            </a:extLst>
+          </p:cNvPr>
+          <p:cNvSpPr txBox="1"/>
+          <p:nvPr/>
+        </p:nvSpPr>
+        <p:spPr>
+          <a:xfrm>
+            <a:off x="4224986" y="4447102"/>
+            <a:ext cx="1533123" cy="461665"/>
+          </a:xfrm>
+          <a:prstGeom prst="rect">
+            <a:avLst/>
+          </a:prstGeom>
+          <a:noFill/>
+        </p:spPr>
+        <p:txBody>
+          <a:bodyPr wrap="square" rtlCol="0">
+            <a:spAutoFit/>
+          </a:bodyPr>
+          <a:lstStyle/>
+          <a:p>
+            <a:r>
+              <a:rPr lang="en-US" sz="1200" dirty="0"/>
+              <a:t>NCL SCADA system simulator </a:t>
+            </a:r>
+            <a:endParaRPr lang="en-SG" sz="1200" dirty="0"/>
+          </a:p>
+        </p:txBody>
+      </p:sp>
+      <p:sp>
+        <p:nvSpPr>
+          <p:cNvPr id="25" name="TextBox 24">
+            <a:extLst>
+              <a:ext uri="{FF2B5EF4-FFF2-40B4-BE49-F238E27FC236}">
+                <a16:creationId xmlns:a16="http://schemas.microsoft.com/office/drawing/2014/main" id="{015A065E-5E4D-B99D-4752-918661B8CA3B}"/>
+              </a:ext>
+            </a:extLst>
+          </p:cNvPr>
+          <p:cNvSpPr txBox="1"/>
+          <p:nvPr/>
+        </p:nvSpPr>
+        <p:spPr>
+          <a:xfrm>
+            <a:off x="6393367" y="4447101"/>
+            <a:ext cx="1533123" cy="461665"/>
+          </a:xfrm>
+          <a:prstGeom prst="rect">
+            <a:avLst/>
+          </a:prstGeom>
+          <a:noFill/>
+        </p:spPr>
+        <p:txBody>
+          <a:bodyPr wrap="square" rtlCol="0">
+            <a:spAutoFit/>
+          </a:bodyPr>
+          <a:lstStyle/>
+          <a:p>
+            <a:r>
+              <a:rPr lang="en-US" sz="1200" dirty="0"/>
+              <a:t>NCL HMI system simulator </a:t>
+            </a:r>
+            <a:endParaRPr lang="en-SG" sz="1200" dirty="0"/>
+          </a:p>
+        </p:txBody>
+      </p:sp>
+      <p:sp>
+        <p:nvSpPr>
+          <p:cNvPr id="26" name="TextBox 25">
+            <a:extLst>
+              <a:ext uri="{FF2B5EF4-FFF2-40B4-BE49-F238E27FC236}">
+                <a16:creationId xmlns:a16="http://schemas.microsoft.com/office/drawing/2014/main" id="{D7316DE6-59D4-9169-2CCC-5FE003816847}"/>
+              </a:ext>
+            </a:extLst>
+          </p:cNvPr>
+          <p:cNvSpPr txBox="1"/>
+          <p:nvPr/>
+        </p:nvSpPr>
+        <p:spPr>
+          <a:xfrm>
+            <a:off x="9369710" y="4881496"/>
+            <a:ext cx="1107198" cy="523220"/>
+          </a:xfrm>
+          <a:prstGeom prst="rect">
+            <a:avLst/>
+          </a:prstGeom>
+          <a:noFill/>
+        </p:spPr>
+        <p:txBody>
+          <a:bodyPr wrap="square" rtlCol="0">
+            <a:spAutoFit/>
+          </a:bodyPr>
+          <a:lstStyle/>
+          <a:p>
+            <a:r>
+              <a:rPr lang="en-US" sz="1400" dirty="0"/>
+              <a:t>OT system user </a:t>
+            </a:r>
+            <a:endParaRPr lang="en-SG" sz="1400" dirty="0"/>
+          </a:p>
+        </p:txBody>
+      </p:sp>
+      <p:cxnSp>
+        <p:nvCxnSpPr>
+          <p:cNvPr id="23" name="Straight Arrow Connector 22">
+            <a:extLst>
+              <a:ext uri="{FF2B5EF4-FFF2-40B4-BE49-F238E27FC236}">
+                <a16:creationId xmlns:a16="http://schemas.microsoft.com/office/drawing/2014/main" id="{7CEB8CF6-C7F1-8852-55C0-3A3D2DA95568}"/>
+              </a:ext>
+            </a:extLst>
+          </p:cNvPr>
+          <p:cNvCxnSpPr>
+            <a:stCxn id="8" idx="1"/>
+          </p:cNvCxnSpPr>
+          <p:nvPr/>
+        </p:nvCxnSpPr>
+        <p:spPr>
+          <a:xfrm flipH="1" flipV="1">
+            <a:off x="7992932" y="2774321"/>
+            <a:ext cx="750905" cy="1"/>
+          </a:xfrm>
+          <a:prstGeom prst="straightConnector1">
+            <a:avLst/>
+          </a:prstGeom>
+          <a:ln w="19050">
+            <a:solidFill>
+              <a:srgbClr val="00B050"/>
+            </a:solidFill>
+            <a:prstDash val="sysDash"/>
+            <a:tailEnd type="triangle"/>
+          </a:ln>
+        </p:spPr>
+        <p:style>
+          <a:lnRef idx="1">
+            <a:schemeClr val="accent1"/>
+          </a:lnRef>
+          <a:fillRef idx="0">
+            <a:schemeClr val="accent1"/>
+          </a:fillRef>
+          <a:effectRef idx="0">
+            <a:schemeClr val="accent1"/>
+          </a:effectRef>
+          <a:fontRef idx="minor">
+            <a:schemeClr val="tx1"/>
+          </a:fontRef>
+        </p:style>
+      </p:cxnSp>
+      <p:cxnSp>
+        <p:nvCxnSpPr>
+          <p:cNvPr id="29" name="Straight Arrow Connector 28">
+            <a:extLst>
+              <a:ext uri="{FF2B5EF4-FFF2-40B4-BE49-F238E27FC236}">
+                <a16:creationId xmlns:a16="http://schemas.microsoft.com/office/drawing/2014/main" id="{1B67E2C7-12EB-05DF-597C-038BBF8CF946}"/>
+              </a:ext>
+            </a:extLst>
+          </p:cNvPr>
+          <p:cNvCxnSpPr>
+            <a:cxnSpLocks/>
+          </p:cNvCxnSpPr>
+          <p:nvPr/>
+        </p:nvCxnSpPr>
+        <p:spPr>
+          <a:xfrm flipH="1">
+            <a:off x="7391534" y="5085351"/>
+            <a:ext cx="1282132" cy="0"/>
+          </a:xfrm>
+          <a:prstGeom prst="straightConnector1">
+            <a:avLst/>
+          </a:prstGeom>
+          <a:ln w="19050">
+            <a:solidFill>
+              <a:srgbClr val="00B050"/>
+            </a:solidFill>
+            <a:prstDash val="sysDash"/>
+            <a:tailEnd type="triangle"/>
+          </a:ln>
+        </p:spPr>
+        <p:style>
+          <a:lnRef idx="1">
+            <a:schemeClr val="accent1"/>
+          </a:lnRef>
+          <a:fillRef idx="0">
+            <a:schemeClr val="accent1"/>
+          </a:fillRef>
+          <a:effectRef idx="0">
+            <a:schemeClr val="accent1"/>
+          </a:effectRef>
+          <a:fontRef idx="minor">
+            <a:schemeClr val="tx1"/>
+          </a:fontRef>
+        </p:style>
+      </p:cxnSp>
+      <p:cxnSp>
+        <p:nvCxnSpPr>
+          <p:cNvPr id="30" name="Straight Arrow Connector 29">
+            <a:extLst>
+              <a:ext uri="{FF2B5EF4-FFF2-40B4-BE49-F238E27FC236}">
+                <a16:creationId xmlns:a16="http://schemas.microsoft.com/office/drawing/2014/main" id="{0AAAAFBB-6952-956A-19B5-FDAE73C87691}"/>
+              </a:ext>
+            </a:extLst>
+          </p:cNvPr>
+          <p:cNvCxnSpPr/>
+          <p:nvPr/>
+        </p:nvCxnSpPr>
+        <p:spPr>
+          <a:xfrm>
+            <a:off x="5558117" y="4447101"/>
+            <a:ext cx="835250" cy="0"/>
+          </a:xfrm>
+          <a:prstGeom prst="straightConnector1">
+            <a:avLst/>
+          </a:prstGeom>
+          <a:ln>
+            <a:tailEnd type="triangle"/>
+          </a:ln>
+        </p:spPr>
+        <p:style>
+          <a:lnRef idx="1">
+            <a:schemeClr val="accent1"/>
+          </a:lnRef>
+          <a:fillRef idx="0">
+            <a:schemeClr val="accent1"/>
+          </a:fillRef>
+          <a:effectRef idx="0">
+            <a:schemeClr val="accent1"/>
+          </a:effectRef>
+          <a:fontRef idx="minor">
+            <a:schemeClr val="tx1"/>
+          </a:fontRef>
+        </p:style>
+      </p:cxnSp>
+      <p:cxnSp>
+        <p:nvCxnSpPr>
+          <p:cNvPr id="34" name="Connector: Elbow 33">
+            <a:extLst>
+              <a:ext uri="{FF2B5EF4-FFF2-40B4-BE49-F238E27FC236}">
+                <a16:creationId xmlns:a16="http://schemas.microsoft.com/office/drawing/2014/main" id="{86D4ED0C-AFFB-6A29-FCAF-75C4FADC47DF}"/>
+              </a:ext>
+            </a:extLst>
+          </p:cNvPr>
+          <p:cNvCxnSpPr>
+            <a:endCxn id="2050" idx="1"/>
+          </p:cNvCxnSpPr>
+          <p:nvPr/>
+        </p:nvCxnSpPr>
+        <p:spPr>
+          <a:xfrm>
+            <a:off x="4723475" y="4521778"/>
+            <a:ext cx="1829198" cy="679737"/>
+          </a:xfrm>
+          <a:prstGeom prst="bentConnector3">
+            <a:avLst>
+              <a:gd name="adj1" fmla="val -1753"/>
+            </a:avLst>
+          </a:prstGeom>
+          <a:ln>
+            <a:tailEnd type="triangle"/>
+          </a:ln>
+        </p:spPr>
+        <p:style>
+          <a:lnRef idx="1">
+            <a:schemeClr val="accent1"/>
+          </a:lnRef>
+          <a:fillRef idx="0">
+            <a:schemeClr val="accent1"/>
+          </a:fillRef>
+          <a:effectRef idx="0">
+            <a:schemeClr val="accent1"/>
+          </a:effectRef>
+          <a:fontRef idx="minor">
+            <a:schemeClr val="tx1"/>
+          </a:fontRef>
+        </p:style>
+      </p:cxnSp>
+      <p:pic>
+        <p:nvPicPr>
+          <p:cNvPr id="2054" name="Picture 6" descr="Transform networking, best managed network you can buy | NTT">
+            <a:extLst>
+              <a:ext uri="{FF2B5EF4-FFF2-40B4-BE49-F238E27FC236}">
+                <a16:creationId xmlns:a16="http://schemas.microsoft.com/office/drawing/2014/main" id="{E2998229-F1B6-5E1C-D65A-5A0335F557DE}"/>
+              </a:ext>
+            </a:extLst>
+          </p:cNvPr>
+          <p:cNvPicPr>
+            <a:picLocks noChangeAspect="1" noChangeArrowheads="1"/>
+          </p:cNvPicPr>
+          <p:nvPr/>
+        </p:nvPicPr>
+        <p:blipFill>
+          <a:blip r:embed="rId11">
+            <a:extLst>
+              <a:ext uri="{28A0092B-C50C-407E-A947-70E740481C1C}">
+                <a14:useLocalDpi xmlns:a14="http://schemas.microsoft.com/office/drawing/2010/main" val="0"/>
+              </a:ext>
+            </a:extLst>
+          </a:blip>
+          <a:srcRect/>
+          <a:stretch>
+            <a:fillRect/>
+          </a:stretch>
+        </p:blipFill>
+        <p:spPr bwMode="auto">
+          <a:xfrm>
+            <a:off x="2210160" y="3128241"/>
+            <a:ext cx="699510" cy="699510"/>
+          </a:xfrm>
+          <a:prstGeom prst="rect">
+            <a:avLst/>
+          </a:prstGeom>
+          <a:noFill/>
+          <a:extLst>
+            <a:ext uri="{909E8E84-426E-40DD-AFC4-6F175D3DCCD1}">
+              <a14:hiddenFill xmlns:a14="http://schemas.microsoft.com/office/drawing/2010/main">
+                <a:solidFill>
+                  <a:srgbClr val="FFFFFF"/>
+                </a:solidFill>
+              </a14:hiddenFill>
+            </a:ext>
+          </a:extLst>
+        </p:spPr>
+      </p:pic>
+      <p:sp>
+        <p:nvSpPr>
+          <p:cNvPr id="39" name="TextBox 38">
+            <a:extLst>
+              <a:ext uri="{FF2B5EF4-FFF2-40B4-BE49-F238E27FC236}">
+                <a16:creationId xmlns:a16="http://schemas.microsoft.com/office/drawing/2014/main" id="{180D6E8E-8E29-74C0-5422-D7C290CB88C8}"/>
+              </a:ext>
+            </a:extLst>
+          </p:cNvPr>
+          <p:cNvSpPr txBox="1"/>
+          <p:nvPr/>
+        </p:nvSpPr>
+        <p:spPr>
+          <a:xfrm>
+            <a:off x="2033642" y="2785877"/>
+            <a:ext cx="1533123" cy="461665"/>
+          </a:xfrm>
+          <a:prstGeom prst="rect">
+            <a:avLst/>
+          </a:prstGeom>
+          <a:noFill/>
+        </p:spPr>
+        <p:txBody>
+          <a:bodyPr wrap="square" rtlCol="0">
+            <a:spAutoFit/>
+          </a:bodyPr>
+          <a:lstStyle/>
+          <a:p>
+            <a:r>
+              <a:rPr lang="en-US" sz="1200" dirty="0"/>
+              <a:t>IT network traffic  simulator </a:t>
+            </a:r>
+            <a:endParaRPr lang="en-SG" sz="1200" dirty="0"/>
+          </a:p>
+        </p:txBody>
+      </p:sp>
+      <p:pic>
+        <p:nvPicPr>
+          <p:cNvPr id="40" name="Picture 4">
+            <a:extLst>
+              <a:ext uri="{FF2B5EF4-FFF2-40B4-BE49-F238E27FC236}">
+                <a16:creationId xmlns:a16="http://schemas.microsoft.com/office/drawing/2014/main" id="{B423637A-F156-F9F2-FC26-929DA6A9C34D}"/>
+              </a:ext>
+            </a:extLst>
+          </p:cNvPr>
+          <p:cNvPicPr>
+            <a:picLocks noChangeAspect="1" noChangeArrowheads="1"/>
+          </p:cNvPicPr>
+          <p:nvPr/>
+        </p:nvPicPr>
+        <p:blipFill>
+          <a:blip r:embed="rId5">
+            <a:extLst>
+              <a:ext uri="{28A0092B-C50C-407E-A947-70E740481C1C}">
+                <a14:useLocalDpi xmlns:a14="http://schemas.microsoft.com/office/drawing/2010/main" val="0"/>
+              </a:ext>
+            </a:extLst>
+          </a:blip>
+          <a:srcRect/>
+          <a:stretch>
+            <a:fillRect/>
+          </a:stretch>
+        </p:blipFill>
+        <p:spPr bwMode="auto">
+          <a:xfrm>
+            <a:off x="753247" y="3177552"/>
+            <a:ext cx="551642" cy="551642"/>
+          </a:xfrm>
+          <a:prstGeom prst="rect">
+            <a:avLst/>
+          </a:prstGeom>
+          <a:noFill/>
+          <a:extLst>
+            <a:ext uri="{909E8E84-426E-40DD-AFC4-6F175D3DCCD1}">
+              <a14:hiddenFill xmlns:a14="http://schemas.microsoft.com/office/drawing/2010/main">
+                <a:solidFill>
+                  <a:srgbClr val="FFFFFF"/>
+                </a:solidFill>
+              </a14:hiddenFill>
+            </a:ext>
+          </a:extLst>
+        </p:spPr>
+      </p:pic>
+      <p:cxnSp>
+        <p:nvCxnSpPr>
+          <p:cNvPr id="41" name="Straight Arrow Connector 40">
+            <a:extLst>
+              <a:ext uri="{FF2B5EF4-FFF2-40B4-BE49-F238E27FC236}">
+                <a16:creationId xmlns:a16="http://schemas.microsoft.com/office/drawing/2014/main" id="{9DFFDBE9-EA93-CFC5-CDAF-56C48EC4DEB6}"/>
+              </a:ext>
+            </a:extLst>
+          </p:cNvPr>
+          <p:cNvCxnSpPr>
+            <a:cxnSpLocks/>
+            <a:stCxn id="40" idx="3"/>
+            <a:endCxn id="2054" idx="1"/>
+          </p:cNvCxnSpPr>
+          <p:nvPr/>
+        </p:nvCxnSpPr>
+        <p:spPr>
+          <a:xfrm>
+            <a:off x="1304889" y="3453373"/>
+            <a:ext cx="905271" cy="0"/>
+          </a:xfrm>
+          <a:prstGeom prst="straightConnector1">
+            <a:avLst/>
+          </a:prstGeom>
+          <a:ln w="19050">
+            <a:solidFill>
+              <a:srgbClr val="00B050"/>
+            </a:solidFill>
+            <a:prstDash val="sysDash"/>
+            <a:tailEnd type="triangle"/>
+          </a:ln>
+        </p:spPr>
+        <p:style>
+          <a:lnRef idx="1">
+            <a:schemeClr val="accent1"/>
+          </a:lnRef>
+          <a:fillRef idx="0">
+            <a:schemeClr val="accent1"/>
+          </a:fillRef>
+          <a:effectRef idx="0">
+            <a:schemeClr val="accent1"/>
+          </a:effectRef>
+          <a:fontRef idx="minor">
+            <a:schemeClr val="tx1"/>
+          </a:fontRef>
+        </p:style>
+      </p:cxnSp>
+      <p:cxnSp>
+        <p:nvCxnSpPr>
+          <p:cNvPr id="44" name="Straight Arrow Connector 43">
+            <a:extLst>
+              <a:ext uri="{FF2B5EF4-FFF2-40B4-BE49-F238E27FC236}">
+                <a16:creationId xmlns:a16="http://schemas.microsoft.com/office/drawing/2014/main" id="{12A44717-0466-232A-6B0E-4587BBD0F875}"/>
+              </a:ext>
+            </a:extLst>
+          </p:cNvPr>
+          <p:cNvCxnSpPr>
+            <a:cxnSpLocks/>
+          </p:cNvCxnSpPr>
+          <p:nvPr/>
+        </p:nvCxnSpPr>
+        <p:spPr>
+          <a:xfrm flipH="1">
+            <a:off x="2974009" y="3503574"/>
+            <a:ext cx="347087" cy="0"/>
+          </a:xfrm>
+          <a:prstGeom prst="straightConnector1">
+            <a:avLst/>
+          </a:prstGeom>
+          <a:ln w="19050">
+            <a:tailEnd type="triangle"/>
+          </a:ln>
+        </p:spPr>
+        <p:style>
+          <a:lnRef idx="1">
+            <a:schemeClr val="accent1"/>
+          </a:lnRef>
+          <a:fillRef idx="0">
+            <a:schemeClr val="accent1"/>
+          </a:fillRef>
+          <a:effectRef idx="0">
+            <a:schemeClr val="accent1"/>
+          </a:effectRef>
+          <a:fontRef idx="minor">
+            <a:schemeClr val="tx1"/>
+          </a:fontRef>
+        </p:style>
+      </p:cxnSp>
+      <p:sp>
+        <p:nvSpPr>
+          <p:cNvPr id="47" name="TextBox 46">
+            <a:extLst>
+              <a:ext uri="{FF2B5EF4-FFF2-40B4-BE49-F238E27FC236}">
+                <a16:creationId xmlns:a16="http://schemas.microsoft.com/office/drawing/2014/main" id="{71638FDF-C495-3CB4-668E-F1EB17D662A4}"/>
+              </a:ext>
+            </a:extLst>
+          </p:cNvPr>
+          <p:cNvSpPr txBox="1"/>
+          <p:nvPr/>
+        </p:nvSpPr>
+        <p:spPr>
+          <a:xfrm>
+            <a:off x="547574" y="2885399"/>
+            <a:ext cx="1107198" cy="307777"/>
+          </a:xfrm>
+          <a:prstGeom prst="rect">
+            <a:avLst/>
+          </a:prstGeom>
+          <a:noFill/>
+        </p:spPr>
+        <p:txBody>
+          <a:bodyPr wrap="square" rtlCol="0">
+            <a:spAutoFit/>
+          </a:bodyPr>
+          <a:lstStyle/>
+          <a:p>
+            <a:r>
+              <a:rPr lang="en-US" sz="1400" dirty="0"/>
+              <a:t>IT engineer</a:t>
+            </a:r>
+            <a:endParaRPr lang="en-SG" sz="1400" dirty="0"/>
+          </a:p>
+        </p:txBody>
+      </p:sp>
+      <p:cxnSp>
+        <p:nvCxnSpPr>
+          <p:cNvPr id="45" name="Connector: Elbow 44">
+            <a:extLst>
+              <a:ext uri="{FF2B5EF4-FFF2-40B4-BE49-F238E27FC236}">
+                <a16:creationId xmlns:a16="http://schemas.microsoft.com/office/drawing/2014/main" id="{8B38DEF9-D5DD-24A1-0E56-6D813AD44A3F}"/>
+              </a:ext>
+            </a:extLst>
+          </p:cNvPr>
+          <p:cNvCxnSpPr>
+            <a:cxnSpLocks/>
+            <a:endCxn id="2052" idx="1"/>
+          </p:cNvCxnSpPr>
+          <p:nvPr/>
+        </p:nvCxnSpPr>
+        <p:spPr>
+          <a:xfrm rot="5400000" flipH="1" flipV="1">
+            <a:off x="3255191" y="4852511"/>
+            <a:ext cx="1799017" cy="454284"/>
+          </a:xfrm>
+          <a:prstGeom prst="bentConnector2">
+            <a:avLst/>
+          </a:prstGeom>
+          <a:ln w="19050">
+            <a:solidFill>
+              <a:srgbClr val="00B050"/>
+            </a:solidFill>
+            <a:prstDash val="sysDash"/>
+            <a:tailEnd type="triangle"/>
+          </a:ln>
+        </p:spPr>
+        <p:style>
+          <a:lnRef idx="1">
+            <a:schemeClr val="accent1"/>
+          </a:lnRef>
+          <a:fillRef idx="0">
+            <a:schemeClr val="accent1"/>
+          </a:fillRef>
+          <a:effectRef idx="0">
+            <a:schemeClr val="accent1"/>
+          </a:effectRef>
+          <a:fontRef idx="minor">
+            <a:schemeClr val="tx1"/>
+          </a:fontRef>
+        </p:style>
+      </p:cxnSp>
+      <p:pic>
+        <p:nvPicPr>
+          <p:cNvPr id="51" name="Picture 4">
+            <a:extLst>
+              <a:ext uri="{FF2B5EF4-FFF2-40B4-BE49-F238E27FC236}">
+                <a16:creationId xmlns:a16="http://schemas.microsoft.com/office/drawing/2014/main" id="{636DB3C9-DE0D-D652-735C-B6A992B7D1C6}"/>
+              </a:ext>
+            </a:extLst>
+          </p:cNvPr>
+          <p:cNvPicPr>
+            <a:picLocks noChangeAspect="1" noChangeArrowheads="1"/>
+          </p:cNvPicPr>
+          <p:nvPr/>
+        </p:nvPicPr>
+        <p:blipFill>
+          <a:blip r:embed="rId5">
+            <a:extLst>
+              <a:ext uri="{28A0092B-C50C-407E-A947-70E740481C1C}">
+                <a14:useLocalDpi xmlns:a14="http://schemas.microsoft.com/office/drawing/2010/main" val="0"/>
+              </a:ext>
+            </a:extLst>
+          </a:blip>
+          <a:srcRect/>
+          <a:stretch>
+            <a:fillRect/>
+          </a:stretch>
+        </p:blipFill>
+        <p:spPr bwMode="auto">
+          <a:xfrm>
+            <a:off x="3641943" y="6056895"/>
+            <a:ext cx="551642" cy="551642"/>
+          </a:xfrm>
+          <a:prstGeom prst="rect">
+            <a:avLst/>
+          </a:prstGeom>
+          <a:noFill/>
+          <a:extLst>
+            <a:ext uri="{909E8E84-426E-40DD-AFC4-6F175D3DCCD1}">
+              <a14:hiddenFill xmlns:a14="http://schemas.microsoft.com/office/drawing/2010/main">
+                <a:solidFill>
+                  <a:srgbClr val="FFFFFF"/>
+                </a:solidFill>
+              </a14:hiddenFill>
+            </a:ext>
+          </a:extLst>
+        </p:spPr>
+      </p:pic>
+      <p:sp>
+        <p:nvSpPr>
+          <p:cNvPr id="52" name="TextBox 51">
+            <a:extLst>
+              <a:ext uri="{FF2B5EF4-FFF2-40B4-BE49-F238E27FC236}">
+                <a16:creationId xmlns:a16="http://schemas.microsoft.com/office/drawing/2014/main" id="{FFCFE1DE-AC5F-A13A-15B9-526C04830833}"/>
+              </a:ext>
+            </a:extLst>
+          </p:cNvPr>
+          <p:cNvSpPr txBox="1"/>
+          <p:nvPr/>
+        </p:nvSpPr>
+        <p:spPr>
+          <a:xfrm>
+            <a:off x="4071695" y="6053836"/>
+            <a:ext cx="1566379" cy="523220"/>
+          </a:xfrm>
+          <a:prstGeom prst="rect">
+            <a:avLst/>
+          </a:prstGeom>
+          <a:noFill/>
+        </p:spPr>
+        <p:txBody>
+          <a:bodyPr wrap="square" rtlCol="0">
+            <a:spAutoFit/>
+          </a:bodyPr>
+          <a:lstStyle/>
+          <a:p>
+            <a:r>
+              <a:rPr lang="en-US" sz="1400" dirty="0"/>
+              <a:t>OT system admin/developer  </a:t>
+            </a:r>
+            <a:endParaRPr lang="en-SG" sz="1400" dirty="0"/>
+          </a:p>
+        </p:txBody>
+      </p:sp>
+      <p:sp>
+        <p:nvSpPr>
+          <p:cNvPr id="54" name="Rectangle 53">
+            <a:extLst>
+              <a:ext uri="{FF2B5EF4-FFF2-40B4-BE49-F238E27FC236}">
+                <a16:creationId xmlns:a16="http://schemas.microsoft.com/office/drawing/2014/main" id="{8B6B0EDF-F091-956A-796F-14F0684F9048}"/>
+              </a:ext>
+            </a:extLst>
+          </p:cNvPr>
+          <p:cNvSpPr/>
+          <p:nvPr/>
+        </p:nvSpPr>
+        <p:spPr>
+          <a:xfrm>
+            <a:off x="1861071" y="903674"/>
+            <a:ext cx="6260951" cy="857792"/>
+          </a:xfrm>
+          <a:prstGeom prst="rect">
+            <a:avLst/>
+          </a:prstGeom>
+          <a:noFill/>
+          <a:ln>
+            <a:solidFill>
+              <a:srgbClr val="FF0000"/>
+            </a:solidFill>
+          </a:ln>
+        </p:spPr>
+        <p:style>
+          <a:lnRef idx="2">
+            <a:schemeClr val="accent1">
+              <a:shade val="50000"/>
+            </a:schemeClr>
+          </a:lnRef>
+          <a:fillRef idx="1">
+            <a:schemeClr val="accent1"/>
+          </a:fillRef>
+          <a:effectRef idx="0">
+            <a:schemeClr val="accent1"/>
+          </a:effectRef>
+          <a:fontRef idx="minor">
+            <a:schemeClr val="lt1"/>
+          </a:fontRef>
+        </p:style>
+        <p:txBody>
+          <a:bodyPr rtlCol="0" anchor="ctr"/>
+          <a:lstStyle/>
+          <a:p>
+            <a:pPr algn="ctr"/>
+            <a:endParaRPr lang="en-SG" dirty="0"/>
+          </a:p>
+        </p:txBody>
+      </p:sp>
+      <p:sp>
+        <p:nvSpPr>
+          <p:cNvPr id="55" name="TextBox 54">
+            <a:extLst>
+              <a:ext uri="{FF2B5EF4-FFF2-40B4-BE49-F238E27FC236}">
+                <a16:creationId xmlns:a16="http://schemas.microsoft.com/office/drawing/2014/main" id="{31999E96-5A4F-E9AA-903C-140D17776DA7}"/>
+              </a:ext>
+            </a:extLst>
+          </p:cNvPr>
+          <p:cNvSpPr txBox="1"/>
+          <p:nvPr/>
+        </p:nvSpPr>
+        <p:spPr>
+          <a:xfrm>
+            <a:off x="1819087" y="903673"/>
+            <a:ext cx="2010635" cy="307777"/>
+          </a:xfrm>
+          <a:prstGeom prst="rect">
+            <a:avLst/>
+          </a:prstGeom>
+          <a:noFill/>
+        </p:spPr>
+        <p:txBody>
+          <a:bodyPr wrap="square" rtlCol="0">
+            <a:spAutoFit/>
+          </a:bodyPr>
+          <a:lstStyle/>
+          <a:p>
+            <a:r>
+              <a:rPr lang="en-US" sz="1400" dirty="0"/>
+              <a:t>NCL OT Attack Simulator</a:t>
+            </a:r>
+            <a:endParaRPr lang="en-SG" sz="1400" dirty="0"/>
+          </a:p>
+        </p:txBody>
+      </p:sp>
+      <p:pic>
+        <p:nvPicPr>
+          <p:cNvPr id="2056" name="Picture 8" descr="Hacker Icon or Logo Isolated Sign Symbol Vector Illustration Stock Vector -  Illustration of hacking, hack: 186761177">
+            <a:extLst>
+              <a:ext uri="{FF2B5EF4-FFF2-40B4-BE49-F238E27FC236}">
+                <a16:creationId xmlns:a16="http://schemas.microsoft.com/office/drawing/2014/main" id="{2B8C416A-4E39-4565-1EC2-187E2464DC48}"/>
+              </a:ext>
+            </a:extLst>
+          </p:cNvPr>
+          <p:cNvPicPr>
+            <a:picLocks noChangeAspect="1" noChangeArrowheads="1"/>
+          </p:cNvPicPr>
+          <p:nvPr/>
+        </p:nvPicPr>
+        <p:blipFill>
+          <a:blip r:embed="rId12">
+            <a:extLst>
+              <a:ext uri="{28A0092B-C50C-407E-A947-70E740481C1C}">
+                <a14:useLocalDpi xmlns:a14="http://schemas.microsoft.com/office/drawing/2010/main" val="0"/>
+              </a:ext>
+            </a:extLst>
+          </a:blip>
+          <a:srcRect/>
+          <a:stretch>
+            <a:fillRect/>
+          </a:stretch>
+        </p:blipFill>
+        <p:spPr bwMode="auto">
+          <a:xfrm>
+            <a:off x="3321096" y="1153340"/>
+            <a:ext cx="533679" cy="533679"/>
+          </a:xfrm>
+          <a:prstGeom prst="rect">
+            <a:avLst/>
+          </a:prstGeom>
+          <a:noFill/>
+          <a:extLst>
+            <a:ext uri="{909E8E84-426E-40DD-AFC4-6F175D3DCCD1}">
+              <a14:hiddenFill xmlns:a14="http://schemas.microsoft.com/office/drawing/2010/main">
+                <a:solidFill>
+                  <a:srgbClr val="FFFFFF"/>
+                </a:solidFill>
+              </a14:hiddenFill>
+            </a:ext>
+          </a:extLst>
+        </p:spPr>
+      </p:pic>
+      <p:sp>
+        <p:nvSpPr>
+          <p:cNvPr id="57" name="TextBox 56">
+            <a:extLst>
+              <a:ext uri="{FF2B5EF4-FFF2-40B4-BE49-F238E27FC236}">
+                <a16:creationId xmlns:a16="http://schemas.microsoft.com/office/drawing/2014/main" id="{858533F4-AA03-591D-BD3F-9C1781D42581}"/>
+              </a:ext>
+            </a:extLst>
+          </p:cNvPr>
+          <p:cNvSpPr txBox="1"/>
+          <p:nvPr/>
+        </p:nvSpPr>
+        <p:spPr>
+          <a:xfrm>
+            <a:off x="2402195" y="1212064"/>
+            <a:ext cx="893848" cy="461665"/>
+          </a:xfrm>
+          <a:prstGeom prst="rect">
+            <a:avLst/>
+          </a:prstGeom>
+          <a:noFill/>
+        </p:spPr>
+        <p:txBody>
+          <a:bodyPr wrap="square" rtlCol="0">
+            <a:spAutoFit/>
+          </a:bodyPr>
+          <a:lstStyle/>
+          <a:p>
+            <a:r>
+              <a:rPr lang="en-US" sz="1200" dirty="0"/>
+              <a:t>IT attack Simulation </a:t>
+            </a:r>
+            <a:endParaRPr lang="en-SG" sz="1200" dirty="0"/>
+          </a:p>
+        </p:txBody>
+      </p:sp>
+      <p:pic>
+        <p:nvPicPr>
+          <p:cNvPr id="2058" name="Picture 10" descr="Hack Icon #333519 - Free Icons Library">
+            <a:extLst>
+              <a:ext uri="{FF2B5EF4-FFF2-40B4-BE49-F238E27FC236}">
+                <a16:creationId xmlns:a16="http://schemas.microsoft.com/office/drawing/2014/main" id="{A8BD698E-F103-8C48-2F58-C0B8C541E2A7}"/>
+              </a:ext>
+            </a:extLst>
+          </p:cNvPr>
+          <p:cNvPicPr>
+            <a:picLocks noChangeAspect="1" noChangeArrowheads="1"/>
+          </p:cNvPicPr>
+          <p:nvPr/>
+        </p:nvPicPr>
+        <p:blipFill>
+          <a:blip r:embed="rId13">
+            <a:extLst>
+              <a:ext uri="{28A0092B-C50C-407E-A947-70E740481C1C}">
+                <a14:useLocalDpi xmlns:a14="http://schemas.microsoft.com/office/drawing/2010/main" val="0"/>
+              </a:ext>
+            </a:extLst>
+          </a:blip>
+          <a:srcRect/>
+          <a:stretch>
+            <a:fillRect/>
+          </a:stretch>
+        </p:blipFill>
+        <p:spPr bwMode="auto">
+          <a:xfrm>
+            <a:off x="1989079" y="1219271"/>
+            <a:ext cx="413116" cy="413116"/>
+          </a:xfrm>
+          <a:prstGeom prst="rect">
+            <a:avLst/>
+          </a:prstGeom>
+          <a:noFill/>
+          <a:extLst>
+            <a:ext uri="{909E8E84-426E-40DD-AFC4-6F175D3DCCD1}">
+              <a14:hiddenFill xmlns:a14="http://schemas.microsoft.com/office/drawing/2010/main">
+                <a:solidFill>
+                  <a:srgbClr val="FFFFFF"/>
+                </a:solidFill>
+              </a14:hiddenFill>
+            </a:ext>
+          </a:extLst>
+        </p:spPr>
+      </p:pic>
+      <p:sp>
+        <p:nvSpPr>
+          <p:cNvPr id="62" name="TextBox 61">
+            <a:extLst>
+              <a:ext uri="{FF2B5EF4-FFF2-40B4-BE49-F238E27FC236}">
+                <a16:creationId xmlns:a16="http://schemas.microsoft.com/office/drawing/2014/main" id="{9D5B0F77-252C-C6BB-9E72-54A7ED4DF997}"/>
+              </a:ext>
+            </a:extLst>
+          </p:cNvPr>
+          <p:cNvSpPr txBox="1"/>
+          <p:nvPr/>
+        </p:nvSpPr>
+        <p:spPr>
+          <a:xfrm>
+            <a:off x="3731764" y="1204349"/>
+            <a:ext cx="1064454" cy="461665"/>
+          </a:xfrm>
+          <a:prstGeom prst="rect">
+            <a:avLst/>
+          </a:prstGeom>
+          <a:noFill/>
+        </p:spPr>
+        <p:txBody>
+          <a:bodyPr wrap="square" rtlCol="0">
+            <a:spAutoFit/>
+          </a:bodyPr>
+          <a:lstStyle/>
+          <a:p>
+            <a:r>
+              <a:rPr lang="en-US" sz="1200" dirty="0"/>
+              <a:t>System attack Simulation </a:t>
+            </a:r>
+            <a:endParaRPr lang="en-SG" sz="1200" dirty="0"/>
+          </a:p>
+        </p:txBody>
+      </p:sp>
+      <p:pic>
+        <p:nvPicPr>
+          <p:cNvPr id="2060" name="Picture 12" descr="Icon Hack #394539 - Free Icons Library">
+            <a:extLst>
+              <a:ext uri="{FF2B5EF4-FFF2-40B4-BE49-F238E27FC236}">
+                <a16:creationId xmlns:a16="http://schemas.microsoft.com/office/drawing/2014/main" id="{C6257DDE-CE29-6220-84A7-D01E1EEDF319}"/>
+              </a:ext>
+            </a:extLst>
+          </p:cNvPr>
+          <p:cNvPicPr>
+            <a:picLocks noChangeAspect="1" noChangeArrowheads="1"/>
+          </p:cNvPicPr>
+          <p:nvPr/>
+        </p:nvPicPr>
+        <p:blipFill>
+          <a:blip r:embed="rId14">
+            <a:extLst>
+              <a:ext uri="{28A0092B-C50C-407E-A947-70E740481C1C}">
+                <a14:useLocalDpi xmlns:a14="http://schemas.microsoft.com/office/drawing/2010/main" val="0"/>
+              </a:ext>
+            </a:extLst>
+          </a:blip>
+          <a:srcRect/>
+          <a:stretch>
+            <a:fillRect/>
+          </a:stretch>
+        </p:blipFill>
+        <p:spPr bwMode="auto">
+          <a:xfrm>
+            <a:off x="4881281" y="1240210"/>
+            <a:ext cx="433519" cy="433519"/>
+          </a:xfrm>
+          <a:prstGeom prst="rect">
+            <a:avLst/>
+          </a:prstGeom>
+          <a:noFill/>
+          <a:extLst>
+            <a:ext uri="{909E8E84-426E-40DD-AFC4-6F175D3DCCD1}">
+              <a14:hiddenFill xmlns:a14="http://schemas.microsoft.com/office/drawing/2010/main">
+                <a:solidFill>
+                  <a:srgbClr val="FFFFFF"/>
+                </a:solidFill>
+              </a14:hiddenFill>
+            </a:ext>
+          </a:extLst>
+        </p:spPr>
+      </p:pic>
+      <p:sp>
+        <p:nvSpPr>
+          <p:cNvPr id="64" name="TextBox 63">
+            <a:extLst>
+              <a:ext uri="{FF2B5EF4-FFF2-40B4-BE49-F238E27FC236}">
+                <a16:creationId xmlns:a16="http://schemas.microsoft.com/office/drawing/2014/main" id="{2BE31C32-0857-64E5-5542-2840F1E04781}"/>
+              </a:ext>
+            </a:extLst>
+          </p:cNvPr>
+          <p:cNvSpPr txBox="1"/>
+          <p:nvPr/>
+        </p:nvSpPr>
+        <p:spPr>
+          <a:xfrm>
+            <a:off x="5304910" y="1182684"/>
+            <a:ext cx="1064454" cy="461665"/>
+          </a:xfrm>
+          <a:prstGeom prst="rect">
+            <a:avLst/>
+          </a:prstGeom>
+          <a:noFill/>
+        </p:spPr>
+        <p:txBody>
+          <a:bodyPr wrap="square" rtlCol="0">
+            <a:spAutoFit/>
+          </a:bodyPr>
+          <a:lstStyle/>
+          <a:p>
+            <a:r>
+              <a:rPr lang="en-US" sz="1200" dirty="0"/>
+              <a:t>OT attack Simulation </a:t>
+            </a:r>
+            <a:endParaRPr lang="en-SG" sz="1200" dirty="0"/>
+          </a:p>
+        </p:txBody>
+      </p:sp>
+      <p:pic>
+        <p:nvPicPr>
+          <p:cNvPr id="2062" name="Picture 14" descr="Hack Icon #333501 - Free Icons Library">
+            <a:extLst>
+              <a:ext uri="{FF2B5EF4-FFF2-40B4-BE49-F238E27FC236}">
+                <a16:creationId xmlns:a16="http://schemas.microsoft.com/office/drawing/2014/main" id="{71A35650-1FDA-C1A6-2D63-4E04C221C981}"/>
+              </a:ext>
+            </a:extLst>
+          </p:cNvPr>
+          <p:cNvPicPr>
+            <a:picLocks noChangeAspect="1" noChangeArrowheads="1"/>
+          </p:cNvPicPr>
+          <p:nvPr/>
+        </p:nvPicPr>
+        <p:blipFill>
+          <a:blip r:embed="rId15">
+            <a:extLst>
+              <a:ext uri="{28A0092B-C50C-407E-A947-70E740481C1C}">
+                <a14:useLocalDpi xmlns:a14="http://schemas.microsoft.com/office/drawing/2010/main" val="0"/>
+              </a:ext>
+            </a:extLst>
+          </a:blip>
+          <a:srcRect/>
+          <a:stretch>
+            <a:fillRect/>
+          </a:stretch>
+        </p:blipFill>
+        <p:spPr bwMode="auto">
+          <a:xfrm>
+            <a:off x="6316820" y="1201288"/>
+            <a:ext cx="444348" cy="444348"/>
+          </a:xfrm>
+          <a:prstGeom prst="rect">
+            <a:avLst/>
+          </a:prstGeom>
+          <a:noFill/>
+          <a:extLst>
+            <a:ext uri="{909E8E84-426E-40DD-AFC4-6F175D3DCCD1}">
+              <a14:hiddenFill xmlns:a14="http://schemas.microsoft.com/office/drawing/2010/main">
+                <a:solidFill>
+                  <a:srgbClr val="FFFFFF"/>
+                </a:solidFill>
+              </a14:hiddenFill>
+            </a:ext>
+          </a:extLst>
+        </p:spPr>
+      </p:pic>
+      <p:sp>
+        <p:nvSpPr>
+          <p:cNvPr id="66" name="TextBox 65">
+            <a:extLst>
+              <a:ext uri="{FF2B5EF4-FFF2-40B4-BE49-F238E27FC236}">
+                <a16:creationId xmlns:a16="http://schemas.microsoft.com/office/drawing/2014/main" id="{06A59ABF-62A0-6E1B-5BA0-D3BCB12BCB7A}"/>
+              </a:ext>
+            </a:extLst>
+          </p:cNvPr>
+          <p:cNvSpPr txBox="1"/>
+          <p:nvPr/>
+        </p:nvSpPr>
+        <p:spPr>
+          <a:xfrm>
+            <a:off x="6818443" y="1163161"/>
+            <a:ext cx="1325486" cy="461665"/>
+          </a:xfrm>
+          <a:prstGeom prst="rect">
+            <a:avLst/>
+          </a:prstGeom>
+          <a:noFill/>
+        </p:spPr>
+        <p:txBody>
+          <a:bodyPr wrap="square" rtlCol="0">
+            <a:spAutoFit/>
+          </a:bodyPr>
+          <a:lstStyle/>
+          <a:p>
+            <a:r>
+              <a:rPr lang="en-US" sz="1200" dirty="0"/>
+              <a:t>Attack tools/ malware sandbox </a:t>
+            </a:r>
+            <a:endParaRPr lang="en-SG" sz="1200" dirty="0"/>
+          </a:p>
+        </p:txBody>
+      </p:sp>
+      <p:cxnSp>
+        <p:nvCxnSpPr>
+          <p:cNvPr id="53" name="Straight Arrow Connector 52">
+            <a:extLst>
+              <a:ext uri="{FF2B5EF4-FFF2-40B4-BE49-F238E27FC236}">
+                <a16:creationId xmlns:a16="http://schemas.microsoft.com/office/drawing/2014/main" id="{0A1D650D-D048-7500-ED8C-FD77A8DC92F2}"/>
+              </a:ext>
+            </a:extLst>
+          </p:cNvPr>
+          <p:cNvCxnSpPr>
+            <a:cxnSpLocks/>
+          </p:cNvCxnSpPr>
+          <p:nvPr/>
+        </p:nvCxnSpPr>
+        <p:spPr>
+          <a:xfrm>
+            <a:off x="2833553" y="1653548"/>
+            <a:ext cx="0" cy="1120773"/>
+          </a:xfrm>
+          <a:prstGeom prst="straightConnector1">
+            <a:avLst/>
+          </a:prstGeom>
+          <a:ln>
+            <a:solidFill>
+              <a:srgbClr val="FF0000"/>
+            </a:solidFill>
+            <a:tailEnd type="triangle"/>
+          </a:ln>
+        </p:spPr>
+        <p:style>
+          <a:lnRef idx="1">
+            <a:schemeClr val="accent1"/>
+          </a:lnRef>
+          <a:fillRef idx="0">
+            <a:schemeClr val="accent1"/>
+          </a:fillRef>
+          <a:effectRef idx="0">
+            <a:schemeClr val="accent1"/>
+          </a:effectRef>
+          <a:fontRef idx="minor">
+            <a:schemeClr val="tx1"/>
+          </a:fontRef>
+        </p:style>
+      </p:cxnSp>
+      <p:cxnSp>
+        <p:nvCxnSpPr>
+          <p:cNvPr id="59" name="Straight Arrow Connector 58">
+            <a:extLst>
+              <a:ext uri="{FF2B5EF4-FFF2-40B4-BE49-F238E27FC236}">
+                <a16:creationId xmlns:a16="http://schemas.microsoft.com/office/drawing/2014/main" id="{89C409B3-E489-1976-4E09-5E4D41E1BE46}"/>
+              </a:ext>
+            </a:extLst>
+          </p:cNvPr>
+          <p:cNvCxnSpPr>
+            <a:cxnSpLocks/>
+          </p:cNvCxnSpPr>
+          <p:nvPr/>
+        </p:nvCxnSpPr>
+        <p:spPr>
+          <a:xfrm>
+            <a:off x="4224986" y="1667917"/>
+            <a:ext cx="0" cy="629387"/>
+          </a:xfrm>
+          <a:prstGeom prst="straightConnector1">
+            <a:avLst/>
+          </a:prstGeom>
+          <a:ln>
+            <a:solidFill>
+              <a:srgbClr val="FF0000"/>
+            </a:solidFill>
+            <a:tailEnd type="triangle"/>
+          </a:ln>
+        </p:spPr>
+        <p:style>
+          <a:lnRef idx="1">
+            <a:schemeClr val="accent1"/>
+          </a:lnRef>
+          <a:fillRef idx="0">
+            <a:schemeClr val="accent1"/>
+          </a:fillRef>
+          <a:effectRef idx="0">
+            <a:schemeClr val="accent1"/>
+          </a:effectRef>
+          <a:fontRef idx="minor">
+            <a:schemeClr val="tx1"/>
+          </a:fontRef>
+        </p:style>
+      </p:cxnSp>
+      <p:cxnSp>
+        <p:nvCxnSpPr>
+          <p:cNvPr id="65" name="Connector: Elbow 64">
+            <a:extLst>
+              <a:ext uri="{FF2B5EF4-FFF2-40B4-BE49-F238E27FC236}">
+                <a16:creationId xmlns:a16="http://schemas.microsoft.com/office/drawing/2014/main" id="{221845C3-7C1A-F03E-AF8D-D3CD3B98DE80}"/>
+              </a:ext>
+            </a:extLst>
+          </p:cNvPr>
+          <p:cNvCxnSpPr>
+            <a:cxnSpLocks/>
+            <a:stCxn id="2060" idx="2"/>
+            <a:endCxn id="20" idx="0"/>
+          </p:cNvCxnSpPr>
+          <p:nvPr/>
+        </p:nvCxnSpPr>
+        <p:spPr>
+          <a:xfrm rot="16200000" flipH="1">
+            <a:off x="5873119" y="898651"/>
+            <a:ext cx="617766" cy="2167922"/>
+          </a:xfrm>
+          <a:prstGeom prst="bentConnector3">
+            <a:avLst>
+              <a:gd name="adj1" fmla="val 62190"/>
+            </a:avLst>
+          </a:prstGeom>
+          <a:ln>
+            <a:solidFill>
+              <a:srgbClr val="FF0000"/>
+            </a:solidFill>
+            <a:tailEnd type="triangle"/>
+          </a:ln>
+        </p:spPr>
+        <p:style>
+          <a:lnRef idx="1">
+            <a:schemeClr val="accent1"/>
+          </a:lnRef>
+          <a:fillRef idx="0">
+            <a:schemeClr val="accent1"/>
+          </a:fillRef>
+          <a:effectRef idx="0">
+            <a:schemeClr val="accent1"/>
+          </a:effectRef>
+          <a:fontRef idx="minor">
+            <a:schemeClr val="tx1"/>
+          </a:fontRef>
+        </p:style>
+      </p:cxnSp>
+      <p:pic>
+        <p:nvPicPr>
+          <p:cNvPr id="71" name="Picture 70">
+            <a:extLst>
+              <a:ext uri="{FF2B5EF4-FFF2-40B4-BE49-F238E27FC236}">
+                <a16:creationId xmlns:a16="http://schemas.microsoft.com/office/drawing/2014/main" id="{0649F29A-FF78-B903-E1EF-8351504096C5}"/>
               </a:ext>
             </a:extLst>
           </p:cNvPr>
@@ -4574,32 +6695,74 @@
           <p:nvPr/>
         </p:nvPicPr>
         <p:blipFill>
-          <a:blip r:embed="rId4"/>
+          <a:blip r:embed="rId16"/>
           <a:stretch>
             <a:fillRect/>
           </a:stretch>
         </p:blipFill>
         <p:spPr>
           <a:xfrm>
-            <a:off x="439567" y="1204087"/>
-            <a:ext cx="7735122" cy="5358142"/>
+            <a:off x="2181494" y="4218080"/>
+            <a:ext cx="869003" cy="548844"/>
           </a:xfrm>
           <a:prstGeom prst="rect">
             <a:avLst/>
           </a:prstGeom>
-          <a:ln w="3175">
+          <a:ln w="9525">
             <a:solidFill>
               <a:schemeClr val="tx1"/>
             </a:solidFill>
           </a:ln>
         </p:spPr>
       </p:pic>
-      <p:sp>
-        <p:nvSpPr>
-          <p:cNvPr id="7" name="TextBox 6">
-            <a:extLst>
-              <a:ext uri="{FF2B5EF4-FFF2-40B4-BE49-F238E27FC236}">
-                <a16:creationId xmlns:a16="http://schemas.microsoft.com/office/drawing/2014/main" id="{0142219B-097E-CA68-D603-7899D53749B0}"/>
+      <p:cxnSp>
+        <p:nvCxnSpPr>
+          <p:cNvPr id="73" name="Straight Arrow Connector 72">
+            <a:extLst>
+              <a:ext uri="{FF2B5EF4-FFF2-40B4-BE49-F238E27FC236}">
+                <a16:creationId xmlns:a16="http://schemas.microsoft.com/office/drawing/2014/main" id="{214A9FBB-CBAF-B42D-1A2D-AD8C63FCB0BB}"/>
+              </a:ext>
+            </a:extLst>
+          </p:cNvPr>
+          <p:cNvCxnSpPr>
+            <a:cxnSpLocks/>
+            <a:stCxn id="71" idx="0"/>
+          </p:cNvCxnSpPr>
+          <p:nvPr/>
+        </p:nvCxnSpPr>
+        <p:spPr>
+          <a:xfrm flipH="1" flipV="1">
+            <a:off x="2599299" y="3921040"/>
+            <a:ext cx="0" cy="297040"/>
+          </a:xfrm>
+          <a:prstGeom prst="straightConnector1">
+            <a:avLst/>
+          </a:prstGeom>
+          <a:ln w="28575">
+            <a:tailEnd type="triangle"/>
+          </a:ln>
+        </p:spPr>
+        <p:style>
+          <a:lnRef idx="2">
+            <a:schemeClr val="accent6"/>
+          </a:lnRef>
+          <a:fillRef idx="0">
+            <a:schemeClr val="accent6"/>
+          </a:fillRef>
+          <a:effectRef idx="1">
+            <a:schemeClr val="accent6"/>
+          </a:effectRef>
+          <a:fontRef idx="minor">
+            <a:schemeClr val="tx1"/>
+          </a:fontRef>
+        </p:style>
+      </p:cxnSp>
+      <p:sp>
+        <p:nvSpPr>
+          <p:cNvPr id="82" name="TextBox 81">
+            <a:extLst>
+              <a:ext uri="{FF2B5EF4-FFF2-40B4-BE49-F238E27FC236}">
+                <a16:creationId xmlns:a16="http://schemas.microsoft.com/office/drawing/2014/main" id="{55EBC191-193E-1356-8691-F4DF92A93A63}"/>
               </a:ext>
             </a:extLst>
           </p:cNvPr>
@@ -4608,8 +6771,8 @@
         </p:nvSpPr>
         <p:spPr>
           <a:xfrm>
-            <a:off x="439567" y="623031"/>
-            <a:ext cx="9973835" cy="1162113"/>
+            <a:off x="2106816" y="4819940"/>
+            <a:ext cx="1323606" cy="646331"/>
           </a:xfrm>
           <a:prstGeom prst="rect">
             <a:avLst/>
@@ -4617,77 +6780,101 @@
           <a:noFill/>
         </p:spPr>
         <p:txBody>
-          <a:bodyPr wrap="square">
+          <a:bodyPr wrap="square" rtlCol="0">
             <a:spAutoFit/>
           </a:bodyPr>
           <a:lstStyle/>
           <a:p>
-            <a:pPr>
-              <a:lnSpc>
-                <a:spcPct val="150000"/>
-              </a:lnSpc>
-            </a:pPr>
-            <a:r>
-              <a:rPr lang="en-SG" sz="1600" b="1" dirty="0">
-                <a:solidFill>
-                  <a:srgbClr val="202124"/>
-                </a:solidFill>
-                <a:latin typeface="Google Sans"/>
-              </a:rPr>
-              <a:t>OT simulation test bed: Railway Control System Simulation</a:t>
-            </a:r>
-            <a:r>
-              <a:rPr lang="en-SG" sz="1600" dirty="0">
-                <a:solidFill>
-                  <a:srgbClr val="202124"/>
-                </a:solidFill>
-                <a:latin typeface="Google Sans"/>
-              </a:rPr>
-              <a:t>. </a:t>
-            </a:r>
-          </a:p>
-          <a:p>
-            <a:pPr marL="285750" indent="-285750">
-              <a:lnSpc>
-                <a:spcPct val="150000"/>
-              </a:lnSpc>
-              <a:buFont typeface="Arial" panose="020B0604020202020204" pitchFamily="34" charset="0"/>
-              <a:buChar char="•"/>
-            </a:pPr>
-            <a:endParaRPr lang="en-SG" sz="1600" b="0" i="0" dirty="0">
-              <a:solidFill>
-                <a:srgbClr val="202124"/>
-              </a:solidFill>
-              <a:effectLst/>
-              <a:latin typeface="Google Sans"/>
-            </a:endParaRPr>
-          </a:p>
-          <a:p>
-            <a:pPr>
-              <a:lnSpc>
-                <a:spcPct val="150000"/>
-              </a:lnSpc>
-            </a:pPr>
-            <a:r>
-              <a:rPr lang="en-SG" sz="1600" b="0" i="0" dirty="0">
-                <a:solidFill>
-                  <a:srgbClr val="202124"/>
-                </a:solidFill>
-                <a:effectLst/>
-                <a:latin typeface="Google Sans"/>
-              </a:rPr>
-              <a:t> </a:t>
-            </a:r>
-            <a:endParaRPr lang="en-US" sz="1600" b="1" dirty="0"/>
-          </a:p>
-        </p:txBody>
-      </p:sp>
-      <p:sp>
-        <p:nvSpPr>
-          <p:cNvPr id="8" name="TextBox 7">
-            <a:extLst>
-              <a:ext uri="{FF2B5EF4-FFF2-40B4-BE49-F238E27FC236}">
-                <a16:creationId xmlns:a16="http://schemas.microsoft.com/office/drawing/2014/main" id="{E40F11D6-566A-91B1-1A8C-B06737983F82}"/>
+            <a:r>
+              <a:rPr lang="en-US" sz="1200" dirty="0"/>
+              <a:t>NCL IT traffic analyze/detection  tool </a:t>
+            </a:r>
+            <a:endParaRPr lang="en-SG" sz="1200" dirty="0"/>
+          </a:p>
+        </p:txBody>
+      </p:sp>
+      <p:pic>
+        <p:nvPicPr>
+          <p:cNvPr id="83" name="Picture 82">
+            <a:extLst>
+              <a:ext uri="{FF2B5EF4-FFF2-40B4-BE49-F238E27FC236}">
+                <a16:creationId xmlns:a16="http://schemas.microsoft.com/office/drawing/2014/main" id="{ADC60FEC-F1AA-C13D-C118-F8B187823989}"/>
+              </a:ext>
+            </a:extLst>
+          </p:cNvPr>
+          <p:cNvPicPr>
+            <a:picLocks noChangeAspect="1"/>
+          </p:cNvPicPr>
+          <p:nvPr/>
+        </p:nvPicPr>
+        <p:blipFill>
+          <a:blip r:embed="rId16"/>
+          <a:stretch>
+            <a:fillRect/>
+          </a:stretch>
+        </p:blipFill>
+        <p:spPr>
+          <a:xfrm>
+            <a:off x="8600124" y="3436771"/>
+            <a:ext cx="869003" cy="548844"/>
+          </a:xfrm>
+          <a:prstGeom prst="rect">
+            <a:avLst/>
+          </a:prstGeom>
+          <a:ln w="9525">
+            <a:solidFill>
+              <a:schemeClr val="tx1"/>
+            </a:solidFill>
+          </a:ln>
+        </p:spPr>
+      </p:pic>
+      <p:cxnSp>
+        <p:nvCxnSpPr>
+          <p:cNvPr id="84" name="Straight Arrow Connector 83">
+            <a:extLst>
+              <a:ext uri="{FF2B5EF4-FFF2-40B4-BE49-F238E27FC236}">
+                <a16:creationId xmlns:a16="http://schemas.microsoft.com/office/drawing/2014/main" id="{09BD865B-8DD6-B2DA-D6A3-BE1DF226CC83}"/>
+              </a:ext>
+            </a:extLst>
+          </p:cNvPr>
+          <p:cNvCxnSpPr>
+            <a:cxnSpLocks/>
+          </p:cNvCxnSpPr>
+          <p:nvPr/>
+        </p:nvCxnSpPr>
+        <p:spPr>
+          <a:xfrm flipH="1">
+            <a:off x="7926490" y="3726040"/>
+            <a:ext cx="673634" cy="3154"/>
+          </a:xfrm>
+          <a:prstGeom prst="straightConnector1">
+            <a:avLst/>
+          </a:prstGeom>
+          <a:ln w="28575">
+            <a:tailEnd type="triangle"/>
+          </a:ln>
+        </p:spPr>
+        <p:style>
+          <a:lnRef idx="2">
+            <a:schemeClr val="accent6"/>
+          </a:lnRef>
+          <a:fillRef idx="0">
+            <a:schemeClr val="accent6"/>
+          </a:fillRef>
+          <a:effectRef idx="1">
+            <a:schemeClr val="accent6"/>
+          </a:effectRef>
+          <a:fontRef idx="minor">
+            <a:schemeClr val="tx1"/>
+          </a:fontRef>
+        </p:style>
+      </p:cxnSp>
+      <p:sp>
+        <p:nvSpPr>
+          <p:cNvPr id="86" name="TextBox 85">
+            <a:extLst>
+              <a:ext uri="{FF2B5EF4-FFF2-40B4-BE49-F238E27FC236}">
+                <a16:creationId xmlns:a16="http://schemas.microsoft.com/office/drawing/2014/main" id="{230F7876-2A3C-E68B-D90D-19F928989981}"/>
               </a:ext>
             </a:extLst>
           </p:cNvPr>
@@ -4696,8 +6883,8 @@
         </p:nvSpPr>
         <p:spPr>
           <a:xfrm>
-            <a:off x="8274372" y="1204087"/>
-            <a:ext cx="3560781" cy="2639441"/>
+            <a:off x="9469127" y="3376845"/>
+            <a:ext cx="1323606" cy="461665"/>
           </a:xfrm>
           <a:prstGeom prst="rect">
             <a:avLst/>
@@ -4705,131 +6892,135 @@
           <a:noFill/>
         </p:spPr>
         <p:txBody>
-          <a:bodyPr wrap="square">
+          <a:bodyPr wrap="square" rtlCol="0">
             <a:spAutoFit/>
           </a:bodyPr>
           <a:lstStyle/>
           <a:p>
-            <a:pPr>
-              <a:lnSpc>
-                <a:spcPct val="150000"/>
-              </a:lnSpc>
-            </a:pPr>
-            <a:r>
-              <a:rPr lang="en-SG" sz="1600" b="1" dirty="0">
-                <a:solidFill>
-                  <a:srgbClr val="202124"/>
-                </a:solidFill>
-                <a:latin typeface="Google Sans"/>
-              </a:rPr>
-              <a:t>Simulated components:</a:t>
-            </a:r>
-          </a:p>
-          <a:p>
-            <a:pPr marL="342900" indent="-342900">
-              <a:lnSpc>
-                <a:spcPct val="150000"/>
-              </a:lnSpc>
-              <a:buAutoNum type="arabicPeriod"/>
-            </a:pPr>
-            <a:r>
-              <a:rPr lang="en-SG" sz="1600" b="1" dirty="0">
-                <a:solidFill>
-                  <a:srgbClr val="202124"/>
-                </a:solidFill>
-                <a:latin typeface="Google Sans"/>
-              </a:rPr>
-              <a:t>PLC signal control system </a:t>
-            </a:r>
-          </a:p>
-          <a:p>
-            <a:pPr marL="342900" indent="-342900">
-              <a:lnSpc>
-                <a:spcPct val="150000"/>
-              </a:lnSpc>
-              <a:buAutoNum type="arabicPeriod"/>
-            </a:pPr>
-            <a:r>
-              <a:rPr lang="en-SG" sz="1600" b="1" dirty="0">
-                <a:solidFill>
-                  <a:srgbClr val="202124"/>
-                </a:solidFill>
-                <a:latin typeface="Google Sans"/>
-              </a:rPr>
-              <a:t>Railway sensor system. </a:t>
-            </a:r>
-          </a:p>
-          <a:p>
-            <a:pPr marL="342900" indent="-342900">
-              <a:lnSpc>
-                <a:spcPct val="150000"/>
-              </a:lnSpc>
-              <a:buAutoNum type="arabicPeriod"/>
-            </a:pPr>
-            <a:r>
-              <a:rPr lang="en-SG" sz="1600" b="1" dirty="0">
-                <a:solidFill>
-                  <a:srgbClr val="202124"/>
-                </a:solidFill>
-                <a:latin typeface="Google Sans"/>
-              </a:rPr>
-              <a:t>HMI and monitoring system. </a:t>
-            </a:r>
-          </a:p>
-          <a:p>
-            <a:pPr marL="342900" indent="-342900">
-              <a:lnSpc>
-                <a:spcPct val="150000"/>
-              </a:lnSpc>
-              <a:buAutoNum type="arabicPeriod"/>
-            </a:pPr>
-            <a:endParaRPr lang="en-SG" sz="1600" dirty="0">
-              <a:solidFill>
-                <a:srgbClr val="202124"/>
-              </a:solidFill>
-              <a:latin typeface="Google Sans"/>
-            </a:endParaRPr>
-          </a:p>
-          <a:p>
-            <a:pPr marL="285750" indent="-285750">
-              <a:lnSpc>
-                <a:spcPct val="150000"/>
-              </a:lnSpc>
-              <a:buFont typeface="Arial" panose="020B0604020202020204" pitchFamily="34" charset="0"/>
-              <a:buChar char="•"/>
-            </a:pPr>
-            <a:endParaRPr lang="en-SG" sz="1600" b="0" i="0" dirty="0">
-              <a:solidFill>
-                <a:srgbClr val="202124"/>
-              </a:solidFill>
-              <a:effectLst/>
-              <a:latin typeface="Google Sans"/>
-            </a:endParaRPr>
-          </a:p>
-          <a:p>
-            <a:pPr>
-              <a:lnSpc>
-                <a:spcPct val="150000"/>
-              </a:lnSpc>
-            </a:pPr>
-            <a:r>
-              <a:rPr lang="en-SG" sz="1600" b="0" i="0" dirty="0">
-                <a:solidFill>
-                  <a:srgbClr val="202124"/>
-                </a:solidFill>
-                <a:effectLst/>
-                <a:latin typeface="Google Sans"/>
-              </a:rPr>
-              <a:t> </a:t>
-            </a:r>
-            <a:endParaRPr lang="en-US" sz="1600" b="1" dirty="0"/>
-          </a:p>
-        </p:txBody>
-      </p:sp>
+            <a:r>
+              <a:rPr lang="en-US" sz="1200" dirty="0"/>
+              <a:t>NCL OT firmware attestation tool </a:t>
+            </a:r>
+            <a:endParaRPr lang="en-SG" sz="1200" dirty="0"/>
+          </a:p>
+        </p:txBody>
+      </p:sp>
+      <p:pic>
+        <p:nvPicPr>
+          <p:cNvPr id="87" name="Picture 86">
+            <a:extLst>
+              <a:ext uri="{FF2B5EF4-FFF2-40B4-BE49-F238E27FC236}">
+                <a16:creationId xmlns:a16="http://schemas.microsoft.com/office/drawing/2014/main" id="{CBF2D6BB-968A-1049-8A0D-35AAAA444161}"/>
+              </a:ext>
+            </a:extLst>
+          </p:cNvPr>
+          <p:cNvPicPr>
+            <a:picLocks noChangeAspect="1"/>
+          </p:cNvPicPr>
+          <p:nvPr/>
+        </p:nvPicPr>
+        <p:blipFill>
+          <a:blip r:embed="rId16"/>
+          <a:stretch>
+            <a:fillRect/>
+          </a:stretch>
+        </p:blipFill>
+        <p:spPr>
+          <a:xfrm>
+            <a:off x="4928004" y="5399429"/>
+            <a:ext cx="869003" cy="548844"/>
+          </a:xfrm>
+          <a:prstGeom prst="rect">
+            <a:avLst/>
+          </a:prstGeom>
+          <a:ln w="9525">
+            <a:solidFill>
+              <a:schemeClr val="tx1"/>
+            </a:solidFill>
+          </a:ln>
+        </p:spPr>
+      </p:pic>
+      <p:sp>
+        <p:nvSpPr>
+          <p:cNvPr id="90" name="TextBox 89">
+            <a:extLst>
+              <a:ext uri="{FF2B5EF4-FFF2-40B4-BE49-F238E27FC236}">
+                <a16:creationId xmlns:a16="http://schemas.microsoft.com/office/drawing/2014/main" id="{8244C721-A01A-4EEB-8D84-88859BEDCB29}"/>
+              </a:ext>
+            </a:extLst>
+          </p:cNvPr>
+          <p:cNvSpPr txBox="1"/>
+          <p:nvPr/>
+        </p:nvSpPr>
+        <p:spPr>
+          <a:xfrm>
+            <a:off x="5846410" y="5591570"/>
+            <a:ext cx="1323606" cy="646331"/>
+          </a:xfrm>
+          <a:prstGeom prst="rect">
+            <a:avLst/>
+          </a:prstGeom>
+          <a:noFill/>
+        </p:spPr>
+        <p:txBody>
+          <a:bodyPr wrap="square" rtlCol="0">
+            <a:spAutoFit/>
+          </a:bodyPr>
+          <a:lstStyle/>
+          <a:p>
+            <a:r>
+              <a:rPr lang="en-US" sz="1200" dirty="0"/>
+              <a:t>NCL System performance analyze tool </a:t>
+            </a:r>
+            <a:endParaRPr lang="en-SG" sz="1200" dirty="0"/>
+          </a:p>
+        </p:txBody>
+      </p:sp>
+      <p:cxnSp>
+        <p:nvCxnSpPr>
+          <p:cNvPr id="91" name="Straight Arrow Connector 90">
+            <a:extLst>
+              <a:ext uri="{FF2B5EF4-FFF2-40B4-BE49-F238E27FC236}">
+                <a16:creationId xmlns:a16="http://schemas.microsoft.com/office/drawing/2014/main" id="{7CA69EA9-53DD-B120-63EC-A1BAD3E5AE2D}"/>
+              </a:ext>
+            </a:extLst>
+          </p:cNvPr>
+          <p:cNvCxnSpPr>
+            <a:cxnSpLocks/>
+          </p:cNvCxnSpPr>
+          <p:nvPr/>
+        </p:nvCxnSpPr>
+        <p:spPr>
+          <a:xfrm flipV="1">
+            <a:off x="5183675" y="4853074"/>
+            <a:ext cx="0" cy="513978"/>
+          </a:xfrm>
+          <a:prstGeom prst="straightConnector1">
+            <a:avLst/>
+          </a:prstGeom>
+          <a:ln w="28575">
+            <a:tailEnd type="triangle"/>
+          </a:ln>
+        </p:spPr>
+        <p:style>
+          <a:lnRef idx="2">
+            <a:schemeClr val="accent6"/>
+          </a:lnRef>
+          <a:fillRef idx="0">
+            <a:schemeClr val="accent6"/>
+          </a:fillRef>
+          <a:effectRef idx="1">
+            <a:schemeClr val="accent6"/>
+          </a:effectRef>
+          <a:fontRef idx="minor">
+            <a:schemeClr val="tx1"/>
+          </a:fontRef>
+        </p:style>
+      </p:cxnSp>
     </p:spTree>
     <p:extLst>
       <p:ext uri="{BB962C8B-B14F-4D97-AF65-F5344CB8AC3E}">
-        <p14:creationId xmlns:p14="http://schemas.microsoft.com/office/powerpoint/2010/main" val="3320833713"/>
+        <p14:creationId xmlns:p14="http://schemas.microsoft.com/office/powerpoint/2010/main" val="3847224490"/>
       </p:ext>
     </p:extLst>
   </p:cSld>
@@ -4902,7 +7093,7 @@
                 <a:ea typeface="DengXian" panose="02010600030101010101" pitchFamily="2" charset="-122"/>
                 <a:cs typeface="Times New Roman" panose="02020603050405020304" pitchFamily="18" charset="0"/>
               </a:rPr>
-              <a:t>False data injection attack</a:t>
+              <a:t>Railway system OT attack test bed</a:t>
             </a:r>
             <a:endParaRPr lang="en-SG" sz="2400" dirty="0">
               <a:solidFill>
@@ -4968,10 +7159,277 @@
           </a:extLst>
         </p:spPr>
       </p:pic>
+      <p:pic>
+        <p:nvPicPr>
+          <p:cNvPr id="3" name="Picture 2">
+            <a:extLst>
+              <a:ext uri="{FF2B5EF4-FFF2-40B4-BE49-F238E27FC236}">
+                <a16:creationId xmlns:a16="http://schemas.microsoft.com/office/drawing/2014/main" id="{CE6A3CC4-561A-82C6-DDC5-EE5FA1D4DA39}"/>
+              </a:ext>
+            </a:extLst>
+          </p:cNvPr>
+          <p:cNvPicPr>
+            <a:picLocks noChangeAspect="1"/>
+          </p:cNvPicPr>
+          <p:nvPr/>
+        </p:nvPicPr>
+        <p:blipFill>
+          <a:blip r:embed="rId4"/>
+          <a:stretch>
+            <a:fillRect/>
+          </a:stretch>
+        </p:blipFill>
+        <p:spPr>
+          <a:xfrm>
+            <a:off x="439567" y="1204087"/>
+            <a:ext cx="7735122" cy="5358142"/>
+          </a:xfrm>
+          <a:prstGeom prst="rect">
+            <a:avLst/>
+          </a:prstGeom>
+          <a:ln w="3175">
+            <a:solidFill>
+              <a:schemeClr val="tx1"/>
+            </a:solidFill>
+          </a:ln>
+        </p:spPr>
+      </p:pic>
+      <p:sp>
+        <p:nvSpPr>
+          <p:cNvPr id="7" name="TextBox 6">
+            <a:extLst>
+              <a:ext uri="{FF2B5EF4-FFF2-40B4-BE49-F238E27FC236}">
+                <a16:creationId xmlns:a16="http://schemas.microsoft.com/office/drawing/2014/main" id="{0142219B-097E-CA68-D603-7899D53749B0}"/>
+              </a:ext>
+            </a:extLst>
+          </p:cNvPr>
+          <p:cNvSpPr txBox="1"/>
+          <p:nvPr/>
+        </p:nvSpPr>
+        <p:spPr>
+          <a:xfrm>
+            <a:off x="439567" y="623031"/>
+            <a:ext cx="9973835" cy="1162113"/>
+          </a:xfrm>
+          <a:prstGeom prst="rect">
+            <a:avLst/>
+          </a:prstGeom>
+          <a:noFill/>
+        </p:spPr>
+        <p:txBody>
+          <a:bodyPr wrap="square">
+            <a:spAutoFit/>
+          </a:bodyPr>
+          <a:lstStyle/>
+          <a:p>
+            <a:pPr>
+              <a:lnSpc>
+                <a:spcPct val="150000"/>
+              </a:lnSpc>
+            </a:pPr>
+            <a:r>
+              <a:rPr lang="en-SG" sz="1600" b="1" dirty="0">
+                <a:solidFill>
+                  <a:srgbClr val="202124"/>
+                </a:solidFill>
+                <a:latin typeface="Google Sans"/>
+              </a:rPr>
+              <a:t>OT simulation test bed: Railway Control System Simulation</a:t>
+            </a:r>
+            <a:r>
+              <a:rPr lang="en-SG" sz="1600" dirty="0">
+                <a:solidFill>
+                  <a:srgbClr val="202124"/>
+                </a:solidFill>
+                <a:latin typeface="Google Sans"/>
+              </a:rPr>
+              <a:t>. </a:t>
+            </a:r>
+          </a:p>
+          <a:p>
+            <a:pPr marL="285750" indent="-285750">
+              <a:lnSpc>
+                <a:spcPct val="150000"/>
+              </a:lnSpc>
+              <a:buFont typeface="Arial" panose="020B0604020202020204" pitchFamily="34" charset="0"/>
+              <a:buChar char="•"/>
+            </a:pPr>
+            <a:endParaRPr lang="en-SG" sz="1600" b="0" i="0" dirty="0">
+              <a:solidFill>
+                <a:srgbClr val="202124"/>
+              </a:solidFill>
+              <a:effectLst/>
+              <a:latin typeface="Google Sans"/>
+            </a:endParaRPr>
+          </a:p>
+          <a:p>
+            <a:pPr>
+              <a:lnSpc>
+                <a:spcPct val="150000"/>
+              </a:lnSpc>
+            </a:pPr>
+            <a:r>
+              <a:rPr lang="en-SG" sz="1600" b="0" i="0" dirty="0">
+                <a:solidFill>
+                  <a:srgbClr val="202124"/>
+                </a:solidFill>
+                <a:effectLst/>
+                <a:latin typeface="Google Sans"/>
+              </a:rPr>
+              <a:t> </a:t>
+            </a:r>
+            <a:endParaRPr lang="en-US" sz="1600" b="1" dirty="0"/>
+          </a:p>
+        </p:txBody>
+      </p:sp>
+      <p:sp>
+        <p:nvSpPr>
+          <p:cNvPr id="8" name="TextBox 7">
+            <a:extLst>
+              <a:ext uri="{FF2B5EF4-FFF2-40B4-BE49-F238E27FC236}">
+                <a16:creationId xmlns:a16="http://schemas.microsoft.com/office/drawing/2014/main" id="{E40F11D6-566A-91B1-1A8C-B06737983F82}"/>
+              </a:ext>
+            </a:extLst>
+          </p:cNvPr>
+          <p:cNvSpPr txBox="1"/>
+          <p:nvPr/>
+        </p:nvSpPr>
+        <p:spPr>
+          <a:xfrm>
+            <a:off x="8274372" y="1204087"/>
+            <a:ext cx="3560781" cy="2639441"/>
+          </a:xfrm>
+          <a:prstGeom prst="rect">
+            <a:avLst/>
+          </a:prstGeom>
+          <a:noFill/>
+        </p:spPr>
+        <p:txBody>
+          <a:bodyPr wrap="square">
+            <a:spAutoFit/>
+          </a:bodyPr>
+          <a:lstStyle/>
+          <a:p>
+            <a:pPr>
+              <a:lnSpc>
+                <a:spcPct val="150000"/>
+              </a:lnSpc>
+            </a:pPr>
+            <a:r>
+              <a:rPr lang="en-SG" sz="1600" b="1" dirty="0">
+                <a:solidFill>
+                  <a:srgbClr val="202124"/>
+                </a:solidFill>
+                <a:latin typeface="Google Sans"/>
+              </a:rPr>
+              <a:t>Simulated components:</a:t>
+            </a:r>
+          </a:p>
+          <a:p>
+            <a:pPr marL="342900" indent="-342900">
+              <a:lnSpc>
+                <a:spcPct val="150000"/>
+              </a:lnSpc>
+              <a:buAutoNum type="arabicPeriod"/>
+            </a:pPr>
+            <a:r>
+              <a:rPr lang="en-SG" sz="1600" b="1" dirty="0">
+                <a:solidFill>
+                  <a:srgbClr val="202124"/>
+                </a:solidFill>
+                <a:latin typeface="Google Sans"/>
+              </a:rPr>
+              <a:t>PLC signal control system </a:t>
+            </a:r>
+          </a:p>
+          <a:p>
+            <a:pPr marL="342900" indent="-342900">
+              <a:lnSpc>
+                <a:spcPct val="150000"/>
+              </a:lnSpc>
+              <a:buAutoNum type="arabicPeriod"/>
+            </a:pPr>
+            <a:r>
+              <a:rPr lang="en-SG" sz="1600" b="1" dirty="0">
+                <a:solidFill>
+                  <a:srgbClr val="202124"/>
+                </a:solidFill>
+                <a:latin typeface="Google Sans"/>
+              </a:rPr>
+              <a:t>Railway sensor system. </a:t>
+            </a:r>
+          </a:p>
+          <a:p>
+            <a:pPr marL="342900" indent="-342900">
+              <a:lnSpc>
+                <a:spcPct val="150000"/>
+              </a:lnSpc>
+              <a:buAutoNum type="arabicPeriod"/>
+            </a:pPr>
+            <a:r>
+              <a:rPr lang="en-SG" sz="1600" b="1" dirty="0">
+                <a:solidFill>
+                  <a:srgbClr val="202124"/>
+                </a:solidFill>
+                <a:latin typeface="Google Sans"/>
+              </a:rPr>
+              <a:t>HMI and monitoring system. </a:t>
+            </a:r>
+          </a:p>
+          <a:p>
+            <a:pPr marL="342900" indent="-342900">
+              <a:lnSpc>
+                <a:spcPct val="150000"/>
+              </a:lnSpc>
+              <a:buAutoNum type="arabicPeriod"/>
+            </a:pPr>
+            <a:endParaRPr lang="en-SG" sz="1600" dirty="0">
+              <a:solidFill>
+                <a:srgbClr val="202124"/>
+              </a:solidFill>
+              <a:latin typeface="Google Sans"/>
+            </a:endParaRPr>
+          </a:p>
+          <a:p>
+            <a:pPr marL="285750" indent="-285750">
+              <a:lnSpc>
+                <a:spcPct val="150000"/>
+              </a:lnSpc>
+              <a:buFont typeface="Arial" panose="020B0604020202020204" pitchFamily="34" charset="0"/>
+              <a:buChar char="•"/>
+            </a:pPr>
+            <a:endParaRPr lang="en-SG" sz="1600" b="0" i="0" dirty="0">
+              <a:solidFill>
+                <a:srgbClr val="202124"/>
+              </a:solidFill>
+              <a:effectLst/>
+              <a:latin typeface="Google Sans"/>
+            </a:endParaRPr>
+          </a:p>
+          <a:p>
+            <a:pPr>
+              <a:lnSpc>
+                <a:spcPct val="150000"/>
+              </a:lnSpc>
+            </a:pPr>
+            <a:r>
+              <a:rPr lang="en-SG" sz="1600" b="0" i="0" dirty="0">
+                <a:solidFill>
+                  <a:srgbClr val="202124"/>
+                </a:solidFill>
+                <a:effectLst/>
+                <a:latin typeface="Google Sans"/>
+              </a:rPr>
+              <a:t> </a:t>
+            </a:r>
+            <a:endParaRPr lang="en-US" sz="1600" b="1" dirty="0"/>
+          </a:p>
+        </p:txBody>
+      </p:sp>
     </p:spTree>
     <p:extLst>
       <p:ext uri="{BB962C8B-B14F-4D97-AF65-F5344CB8AC3E}">
-        <p14:creationId xmlns:p14="http://schemas.microsoft.com/office/powerpoint/2010/main" val="3636773593"/>
+        <p14:creationId xmlns:p14="http://schemas.microsoft.com/office/powerpoint/2010/main" val="3320833713"/>
       </p:ext>
     </p:extLst>
   </p:cSld>
@@ -5044,16 +7502,7 @@
                 <a:ea typeface="DengXian" panose="02010600030101010101" pitchFamily="2" charset="-122"/>
                 <a:cs typeface="Times New Roman" panose="02020603050405020304" pitchFamily="18" charset="0"/>
               </a:rPr>
-              <a:t>Man in the mid attach </a:t>
-            </a:r>
-            <a:r>
-              <a:rPr lang="en-SG" sz="2400" dirty="0">
-                <a:solidFill>
-                  <a:schemeClr val="bg1"/>
-                </a:solidFill>
-                <a:latin typeface="Google Sans"/>
-              </a:rPr>
-              <a:t>HMI and monitoring system</a:t>
+              <a:t>False data injection attack</a:t>
             </a:r>
             <a:endParaRPr lang="en-SG" sz="2400" dirty="0">
               <a:solidFill>
@@ -5122,6 +7571,157 @@
     </p:spTree>
     <p:extLst>
       <p:ext uri="{BB962C8B-B14F-4D97-AF65-F5344CB8AC3E}">
+        <p14:creationId xmlns:p14="http://schemas.microsoft.com/office/powerpoint/2010/main" val="3636773593"/>
+      </p:ext>
+    </p:extLst>
+  </p:cSld>
+  <p:clrMapOvr>
+    <a:masterClrMapping/>
+  </p:clrMapOvr>
+</p:sld>
+</file>
+
+<file path=ppt/slides/slide5.xml><?xml version="1.0" encoding="utf-8"?>
+<p:sld xmlns:a="http://schemas.openxmlformats.org/drawingml/2006/main" xmlns:r="http://schemas.openxmlformats.org/officeDocument/2006/relationships" xmlns:p="http://schemas.openxmlformats.org/presentationml/2006/main">
+  <p:cSld>
+    <p:spTree>
+      <p:nvGrpSpPr>
+        <p:cNvPr id="1" name=""/>
+        <p:cNvGrpSpPr/>
+        <p:nvPr/>
+      </p:nvGrpSpPr>
+      <p:grpSpPr>
+        <a:xfrm>
+          <a:off x="0" y="0"/>
+          <a:ext cx="0" cy="0"/>
+          <a:chOff x="0" y="0"/>
+          <a:chExt cx="0" cy="0"/>
+        </a:xfrm>
+      </p:grpSpPr>
+      <p:sp>
+        <p:nvSpPr>
+          <p:cNvPr id="5" name="TextBox 4">
+            <a:extLst>
+              <a:ext uri="{FF2B5EF4-FFF2-40B4-BE49-F238E27FC236}">
+                <a16:creationId xmlns:a16="http://schemas.microsoft.com/office/drawing/2014/main" id="{94DCA203-1A52-470F-AD27-8D5E23443ECE}"/>
+              </a:ext>
+            </a:extLst>
+          </p:cNvPr>
+          <p:cNvSpPr txBox="1"/>
+          <p:nvPr/>
+        </p:nvSpPr>
+        <p:spPr>
+          <a:xfrm>
+            <a:off x="0" y="0"/>
+            <a:ext cx="12191999" cy="461665"/>
+          </a:xfrm>
+          <a:prstGeom prst="rect">
+            <a:avLst/>
+          </a:prstGeom>
+          <a:solidFill>
+            <a:schemeClr val="accent1">
+              <a:lumMod val="75000"/>
+            </a:schemeClr>
+          </a:solidFill>
+          <a:ln>
+            <a:solidFill>
+              <a:schemeClr val="tx1"/>
+            </a:solidFill>
+          </a:ln>
+        </p:spPr>
+        <p:txBody>
+          <a:bodyPr wrap="square" rtlCol="0">
+            <a:spAutoFit/>
+          </a:bodyPr>
+          <a:lstStyle/>
+          <a:p>
+            <a:r>
+              <a:rPr lang="en-US" sz="2400" dirty="0">
+                <a:solidFill>
+                  <a:schemeClr val="bg1"/>
+                </a:solidFill>
+                <a:latin typeface="Calibri" panose="020F0502020204030204" pitchFamily="34" charset="0"/>
+                <a:ea typeface="DengXian" panose="02010600030101010101" pitchFamily="2" charset="-122"/>
+                <a:cs typeface="Times New Roman" panose="02020603050405020304" pitchFamily="18" charset="0"/>
+              </a:rPr>
+              <a:t>Man in the mid attach </a:t>
+            </a:r>
+            <a:r>
+              <a:rPr lang="en-SG" sz="2400" dirty="0">
+                <a:solidFill>
+                  <a:schemeClr val="bg1"/>
+                </a:solidFill>
+                <a:latin typeface="Google Sans"/>
+              </a:rPr>
+              <a:t>HMI and monitoring system</a:t>
+            </a:r>
+            <a:endParaRPr lang="en-SG" sz="2400" dirty="0">
+              <a:solidFill>
+                <a:schemeClr val="bg1"/>
+              </a:solidFill>
+              <a:effectLst/>
+              <a:latin typeface="Calibri" panose="020F0502020204030204" pitchFamily="34" charset="0"/>
+              <a:ea typeface="DengXian" panose="02010600030101010101" pitchFamily="2" charset="-122"/>
+              <a:cs typeface="Times New Roman" panose="02020603050405020304" pitchFamily="18" charset="0"/>
+            </a:endParaRPr>
+          </a:p>
+        </p:txBody>
+      </p:sp>
+      <p:pic>
+        <p:nvPicPr>
+          <p:cNvPr id="6" name="Picture 2" descr="National Cybersecurity R&amp;D Laboratories">
+            <a:extLst>
+              <a:ext uri="{FF2B5EF4-FFF2-40B4-BE49-F238E27FC236}">
+                <a16:creationId xmlns:a16="http://schemas.microsoft.com/office/drawing/2014/main" id="{CC7242C1-E669-4E5E-827F-AB526A4EEFDC}"/>
+              </a:ext>
+            </a:extLst>
+          </p:cNvPr>
+          <p:cNvPicPr>
+            <a:picLocks noChangeAspect="1" noChangeArrowheads="1"/>
+          </p:cNvPicPr>
+          <p:nvPr/>
+        </p:nvPicPr>
+        <p:blipFill>
+          <a:blip r:embed="rId3">
+            <a:extLst>
+              <a:ext uri="{28A0092B-C50C-407E-A947-70E740481C1C}">
+                <a14:useLocalDpi xmlns:a14="http://schemas.microsoft.com/office/drawing/2010/main" val="0"/>
+              </a:ext>
+            </a:extLst>
+          </a:blip>
+          <a:srcRect/>
+          <a:stretch>
+            <a:fillRect/>
+          </a:stretch>
+        </p:blipFill>
+        <p:spPr bwMode="auto">
+          <a:xfrm>
+            <a:off x="11547974" y="49016"/>
+            <a:ext cx="574358" cy="353452"/>
+          </a:xfrm>
+          <a:prstGeom prst="rect">
+            <a:avLst/>
+          </a:prstGeom>
+          <a:noFill/>
+          <a:ln w="12700">
+            <a:solidFill>
+              <a:schemeClr val="tx1"/>
+            </a:solidFill>
+          </a:ln>
+          <a:extLst>
+            <a:ext uri="{909E8E84-426E-40DD-AFC4-6F175D3DCCD1}">
+              <a14:hiddenFill xmlns:a14="http://schemas.microsoft.com/office/drawing/2010/main">
+                <a:solidFill>
+                  <a:srgbClr val="FFFFFF"/>
+                </a:solidFill>
+              </a14:hiddenFill>
+            </a:ext>
+          </a:extLst>
+        </p:spPr>
+      </p:pic>
+    </p:spTree>
+    <p:extLst>
+      <p:ext uri="{BB962C8B-B14F-4D97-AF65-F5344CB8AC3E}">
         <p14:creationId xmlns:p14="http://schemas.microsoft.com/office/powerpoint/2010/main" val="935811798"/>
       </p:ext>
     </p:extLst>
@@ -5132,7 +7732,7 @@
 </p:sld>
 </file>
 
-<file path=ppt/slides/slide5.xml><?xml version="1.0" encoding="utf-8"?>
+<file path=ppt/slides/slide6.xml><?xml version="1.0" encoding="utf-8"?>
 <p:sld xmlns:a="http://schemas.openxmlformats.org/drawingml/2006/main" xmlns:r="http://schemas.openxmlformats.org/officeDocument/2006/relationships" xmlns:p="http://schemas.openxmlformats.org/presentationml/2006/main">
   <p:cSld>
     <p:spTree>

</xml_diff>